<commit_message>
Update 코로나19에따른 스포츠시설 폐업 수(20201228_20210103).pptx
</commit_message>
<xml_diff>
--- a/standard_in_2020-12-31/코로나19에따른 스포츠시설 폐업 수(20201228_20210103).pptx
+++ b/standard_in_2020-12-31/코로나19에따른 스포츠시설 폐업 수(20201228_20210103).pptx
@@ -21,6 +21,7 @@
     <p:sldId id="272" r:id="rId15"/>
     <p:sldId id="275" r:id="rId16"/>
     <p:sldId id="276" r:id="rId17"/>
+    <p:sldId id="277" r:id="rId18"/>
   </p:sldIdLst>
   <p:sldSz cx="12192000" cy="6858000"/>
   <p:notesSz cx="6858000" cy="9144000"/>
@@ -12955,7 +12956,7 @@
         <p:spPr>
           <a:xfrm>
             <a:off x="431882" y="1458049"/>
-            <a:ext cx="9169316" cy="400110"/>
+            <a:ext cx="2022069" cy="400110"/>
           </a:xfrm>
           <a:prstGeom prst="rect">
             <a:avLst/>
@@ -12977,35 +12978,7 @@
                 <a:latin typeface="나눔스퀘어OTF ExtraBold" panose="020B0600000101010101" pitchFamily="34" charset="-127"/>
                 <a:ea typeface="나눔스퀘어OTF ExtraBold" panose="020B0600000101010101" pitchFamily="34" charset="-127"/>
               </a:rPr>
-              <a:t>폐업 수 줄이기 ①</a:t>
-            </a:r>
-            <a:r>
-              <a:rPr lang="en-US" altLang="ko-KR" sz="2000" dirty="0">
-                <a:latin typeface="나눔스퀘어OTF ExtraBold" panose="020B0600000101010101" pitchFamily="34" charset="-127"/>
-                <a:ea typeface="나눔스퀘어OTF ExtraBold" panose="020B0600000101010101" pitchFamily="34" charset="-127"/>
-              </a:rPr>
-              <a:t>: </a:t>
-            </a:r>
-            <a:r>
-              <a:rPr lang="ko-KR" altLang="en-US" sz="2000" dirty="0">
-                <a:latin typeface="나눔스퀘어OTF ExtraBold" panose="020B0600000101010101" pitchFamily="34" charset="-127"/>
-                <a:ea typeface="나눔스퀘어OTF ExtraBold" panose="020B0600000101010101" pitchFamily="34" charset="-127"/>
-              </a:rPr>
-              <a:t>코로나 </a:t>
-            </a:r>
-            <a:r>
-              <a:rPr lang="en-US" altLang="ko-KR" sz="2000" dirty="0">
-                <a:latin typeface="나눔스퀘어OTF ExtraBold" panose="020B0600000101010101" pitchFamily="34" charset="-127"/>
-                <a:ea typeface="나눔스퀘어OTF ExtraBold" panose="020B0600000101010101" pitchFamily="34" charset="-127"/>
-              </a:rPr>
-              <a:t>19 </a:t>
-            </a:r>
-            <a:r>
-              <a:rPr lang="ko-KR" altLang="en-US" sz="2000" dirty="0">
-                <a:latin typeface="나눔스퀘어OTF ExtraBold" panose="020B0600000101010101" pitchFamily="34" charset="-127"/>
-                <a:ea typeface="나눔스퀘어OTF ExtraBold" panose="020B0600000101010101" pitchFamily="34" charset="-127"/>
-              </a:rPr>
-              <a:t>관련 시설 운영 지침 공표 제시</a:t>
+              <a:t>폐업 수 줄이기</a:t>
             </a:r>
             <a:endParaRPr lang="en-US" altLang="ko-KR" sz="2000" dirty="0">
               <a:latin typeface="나눔스퀘어OTF ExtraBold" panose="020B0600000101010101" pitchFamily="34" charset="-127"/>
@@ -13226,6 +13199,415 @@
           </a:p>
         </p:txBody>
       </p:sp>
+      <p:grpSp>
+        <p:nvGrpSpPr>
+          <p:cNvPr id="12" name="그룹 11">
+            <a:extLst>
+              <a:ext uri="{FF2B5EF4-FFF2-40B4-BE49-F238E27FC236}">
+                <a16:creationId xmlns:a16="http://schemas.microsoft.com/office/drawing/2014/main" id="{2515D3CF-BAFB-4E88-90B7-6A5D01A14244}"/>
+              </a:ext>
+            </a:extLst>
+          </p:cNvPr>
+          <p:cNvGrpSpPr/>
+          <p:nvPr/>
+        </p:nvGrpSpPr>
+        <p:grpSpPr>
+          <a:xfrm>
+            <a:off x="2101156" y="2575701"/>
+            <a:ext cx="8387232" cy="3339484"/>
+            <a:chOff x="1399592" y="1943924"/>
+            <a:chExt cx="8387232" cy="3339484"/>
+          </a:xfrm>
+        </p:grpSpPr>
+        <p:sp>
+          <p:nvSpPr>
+            <p:cNvPr id="7" name="TextBox 6">
+              <a:extLst>
+                <a:ext uri="{FF2B5EF4-FFF2-40B4-BE49-F238E27FC236}">
+                  <a16:creationId xmlns:a16="http://schemas.microsoft.com/office/drawing/2014/main" id="{64315274-BABA-47B7-ACBA-7F4CB064518C}"/>
+                </a:ext>
+              </a:extLst>
+            </p:cNvPr>
+            <p:cNvSpPr txBox="1"/>
+            <p:nvPr/>
+          </p:nvSpPr>
+          <p:spPr>
+            <a:xfrm>
+              <a:off x="1399592" y="1943924"/>
+              <a:ext cx="8387232" cy="369332"/>
+            </a:xfrm>
+            <a:prstGeom prst="rect">
+              <a:avLst/>
+            </a:prstGeom>
+            <a:noFill/>
+          </p:spPr>
+          <p:txBody>
+            <a:bodyPr wrap="none" rtlCol="0">
+              <a:spAutoFit/>
+            </a:bodyPr>
+            <a:lstStyle/>
+            <a:p>
+              <a:r>
+                <a:rPr lang="en-US" altLang="ko-KR" dirty="0">
+                  <a:latin typeface="나눔스퀘어OTF_ac Bold" panose="020B0600000101010101" pitchFamily="34" charset="-127"/>
+                  <a:ea typeface="나눔스퀘어OTF_ac Bold" panose="020B0600000101010101" pitchFamily="34" charset="-127"/>
+                </a:rPr>
+                <a:t>1.</a:t>
+              </a:r>
+              <a:r>
+                <a:rPr lang="ko-KR" altLang="en-US" dirty="0">
+                  <a:latin typeface="나눔스퀘어OTF_ac Bold" panose="020B0600000101010101" pitchFamily="34" charset="-127"/>
+                  <a:ea typeface="나눔스퀘어OTF_ac Bold" panose="020B0600000101010101" pitchFamily="34" charset="-127"/>
+                </a:rPr>
+                <a:t> 실내 체육 시설의 위생 전문 업체 필수 및 </a:t>
+              </a:r>
+              <a:r>
+                <a:rPr lang="en-US" altLang="ko-KR" dirty="0">
+                  <a:latin typeface="나눔스퀘어OTF_ac Bold" panose="020B0600000101010101" pitchFamily="34" charset="-127"/>
+                  <a:ea typeface="나눔스퀘어OTF_ac Bold" panose="020B0600000101010101" pitchFamily="34" charset="-127"/>
+                </a:rPr>
+                <a:t>1</a:t>
+              </a:r>
+              <a:r>
+                <a:rPr lang="ko-KR" altLang="en-US" dirty="0">
+                  <a:latin typeface="나눔스퀘어OTF_ac Bold" panose="020B0600000101010101" pitchFamily="34" charset="-127"/>
+                  <a:ea typeface="나눔스퀘어OTF_ac Bold" panose="020B0600000101010101" pitchFamily="34" charset="-127"/>
+                </a:rPr>
+                <a:t>일 </a:t>
+              </a:r>
+              <a:r>
+                <a:rPr lang="en-US" altLang="ko-KR" dirty="0">
+                  <a:latin typeface="나눔스퀘어OTF_ac Bold" panose="020B0600000101010101" pitchFamily="34" charset="-127"/>
+                  <a:ea typeface="나눔스퀘어OTF_ac Bold" panose="020B0600000101010101" pitchFamily="34" charset="-127"/>
+                </a:rPr>
+                <a:t>3</a:t>
+              </a:r>
+              <a:r>
+                <a:rPr lang="ko-KR" altLang="en-US" dirty="0">
+                  <a:latin typeface="나눔스퀘어OTF_ac Bold" panose="020B0600000101010101" pitchFamily="34" charset="-127"/>
+                  <a:ea typeface="나눔스퀘어OTF_ac Bold" panose="020B0600000101010101" pitchFamily="34" charset="-127"/>
+                </a:rPr>
+                <a:t>회 이상 검진</a:t>
+              </a:r>
+              <a:r>
+                <a:rPr lang="en-US" altLang="ko-KR" dirty="0">
+                  <a:latin typeface="나눔스퀘어OTF_ac Bold" panose="020B0600000101010101" pitchFamily="34" charset="-127"/>
+                  <a:ea typeface="나눔스퀘어OTF_ac Bold" panose="020B0600000101010101" pitchFamily="34" charset="-127"/>
+                </a:rPr>
+                <a:t>(CCTV </a:t>
+              </a:r>
+              <a:r>
+                <a:rPr lang="ko-KR" altLang="en-US" dirty="0" err="1">
+                  <a:latin typeface="나눔스퀘어OTF_ac Bold" panose="020B0600000101010101" pitchFamily="34" charset="-127"/>
+                  <a:ea typeface="나눔스퀘어OTF_ac Bold" panose="020B0600000101010101" pitchFamily="34" charset="-127"/>
+                </a:rPr>
+                <a:t>녹화본</a:t>
+              </a:r>
+              <a:r>
+                <a:rPr lang="ko-KR" altLang="en-US" dirty="0">
+                  <a:latin typeface="나눔스퀘어OTF_ac Bold" panose="020B0600000101010101" pitchFamily="34" charset="-127"/>
+                  <a:ea typeface="나눔스퀘어OTF_ac Bold" panose="020B0600000101010101" pitchFamily="34" charset="-127"/>
+                </a:rPr>
+                <a:t> 저장 </a:t>
+              </a:r>
+              <a:r>
+                <a:rPr lang="en-US" altLang="ko-KR" dirty="0">
+                  <a:latin typeface="나눔스퀘어OTF_ac Bold" panose="020B0600000101010101" pitchFamily="34" charset="-127"/>
+                  <a:ea typeface="나눔스퀘어OTF_ac Bold" panose="020B0600000101010101" pitchFamily="34" charset="-127"/>
+                </a:rPr>
+                <a:t>7</a:t>
+              </a:r>
+              <a:r>
+                <a:rPr lang="ko-KR" altLang="en-US" dirty="0">
+                  <a:latin typeface="나눔스퀘어OTF_ac Bold" panose="020B0600000101010101" pitchFamily="34" charset="-127"/>
+                  <a:ea typeface="나눔스퀘어OTF_ac Bold" panose="020B0600000101010101" pitchFamily="34" charset="-127"/>
+                </a:rPr>
+                <a:t>일 필수</a:t>
+              </a:r>
+              <a:r>
+                <a:rPr lang="en-US" altLang="ko-KR" dirty="0">
+                  <a:latin typeface="나눔스퀘어OTF_ac Bold" panose="020B0600000101010101" pitchFamily="34" charset="-127"/>
+                  <a:ea typeface="나눔스퀘어OTF_ac Bold" panose="020B0600000101010101" pitchFamily="34" charset="-127"/>
+                </a:rPr>
+                <a:t>)</a:t>
+              </a:r>
+            </a:p>
+          </p:txBody>
+        </p:sp>
+        <p:sp>
+          <p:nvSpPr>
+            <p:cNvPr id="11" name="TextBox 10">
+              <a:extLst>
+                <a:ext uri="{FF2B5EF4-FFF2-40B4-BE49-F238E27FC236}">
+                  <a16:creationId xmlns:a16="http://schemas.microsoft.com/office/drawing/2014/main" id="{23EA5004-D457-45D6-9F8C-64E4D3FE6983}"/>
+                </a:ext>
+              </a:extLst>
+            </p:cNvPr>
+            <p:cNvSpPr txBox="1"/>
+            <p:nvPr/>
+          </p:nvSpPr>
+          <p:spPr>
+            <a:xfrm>
+              <a:off x="1399592" y="3429000"/>
+              <a:ext cx="4209807" cy="369332"/>
+            </a:xfrm>
+            <a:prstGeom prst="rect">
+              <a:avLst/>
+            </a:prstGeom>
+            <a:noFill/>
+          </p:spPr>
+          <p:txBody>
+            <a:bodyPr wrap="none" rtlCol="0">
+              <a:spAutoFit/>
+            </a:bodyPr>
+            <a:lstStyle/>
+            <a:p>
+              <a:r>
+                <a:rPr lang="en-US" altLang="ko-KR" dirty="0">
+                  <a:latin typeface="나눔스퀘어OTF_ac Bold" panose="020B0600000101010101" pitchFamily="34" charset="-127"/>
+                  <a:ea typeface="나눔스퀘어OTF_ac Bold" panose="020B0600000101010101" pitchFamily="34" charset="-127"/>
+                </a:rPr>
+                <a:t>2. </a:t>
+              </a:r>
+              <a:r>
+                <a:rPr lang="ko-KR" altLang="en-US" dirty="0">
+                  <a:latin typeface="나눔스퀘어OTF_ac Bold" panose="020B0600000101010101" pitchFamily="34" charset="-127"/>
+                  <a:ea typeface="나눔스퀘어OTF_ac Bold" panose="020B0600000101010101" pitchFamily="34" charset="-127"/>
+                </a:rPr>
+                <a:t>매장 </a:t>
+              </a:r>
+              <a:r>
+                <a:rPr lang="en-US" altLang="ko-KR" dirty="0">
+                  <a:latin typeface="나눔스퀘어OTF_ac Bold" panose="020B0600000101010101" pitchFamily="34" charset="-127"/>
+                  <a:ea typeface="나눔스퀘어OTF_ac Bold" panose="020B0600000101010101" pitchFamily="34" charset="-127"/>
+                </a:rPr>
+                <a:t>1</a:t>
+              </a:r>
+              <a:r>
+                <a:rPr lang="ko-KR" altLang="en-US" dirty="0">
+                  <a:latin typeface="나눔스퀘어OTF_ac Bold" panose="020B0600000101010101" pitchFamily="34" charset="-127"/>
+                  <a:ea typeface="나눔스퀘어OTF_ac Bold" panose="020B0600000101010101" pitchFamily="34" charset="-127"/>
+                </a:rPr>
+                <a:t>시간당 인원 </a:t>
+              </a:r>
+              <a:r>
+                <a:rPr lang="en-US" altLang="ko-KR" dirty="0">
+                  <a:latin typeface="나눔스퀘어OTF_ac Bold" panose="020B0600000101010101" pitchFamily="34" charset="-127"/>
+                  <a:ea typeface="나눔스퀘어OTF_ac Bold" panose="020B0600000101010101" pitchFamily="34" charset="-127"/>
+                </a:rPr>
+                <a:t>3m </a:t>
+              </a:r>
+              <a:r>
+                <a:rPr lang="ko-KR" altLang="en-US" dirty="0">
+                  <a:latin typeface="나눔스퀘어OTF_ac Bold" panose="020B0600000101010101" pitchFamily="34" charset="-127"/>
+                  <a:ea typeface="나눔스퀘어OTF_ac Bold" panose="020B0600000101010101" pitchFamily="34" charset="-127"/>
+                </a:rPr>
+                <a:t>제한 </a:t>
+              </a:r>
+              <a:r>
+                <a:rPr lang="en-US" altLang="ko-KR" dirty="0">
+                  <a:latin typeface="나눔스퀘어OTF_ac Bold" panose="020B0600000101010101" pitchFamily="34" charset="-127"/>
+                  <a:ea typeface="나눔스퀘어OTF_ac Bold" panose="020B0600000101010101" pitchFamily="34" charset="-127"/>
+                </a:rPr>
+                <a:t>3</a:t>
+              </a:r>
+              <a:r>
+                <a:rPr lang="ko-KR" altLang="en-US" dirty="0" err="1">
+                  <a:latin typeface="나눔스퀘어OTF_ac Bold" panose="020B0600000101010101" pitchFamily="34" charset="-127"/>
+                  <a:ea typeface="나눔스퀘어OTF_ac Bold" panose="020B0600000101010101" pitchFamily="34" charset="-127"/>
+                </a:rPr>
+                <a:t>명이하</a:t>
+              </a:r>
+              <a:r>
+                <a:rPr lang="ko-KR" altLang="en-US" dirty="0">
+                  <a:latin typeface="나눔스퀘어OTF_ac Bold" panose="020B0600000101010101" pitchFamily="34" charset="-127"/>
+                  <a:ea typeface="나눔스퀘어OTF_ac Bold" panose="020B0600000101010101" pitchFamily="34" charset="-127"/>
+                </a:rPr>
+                <a:t> 운영</a:t>
+              </a:r>
+            </a:p>
+          </p:txBody>
+        </p:sp>
+        <p:sp>
+          <p:nvSpPr>
+            <p:cNvPr id="47" name="TextBox 46">
+              <a:extLst>
+                <a:ext uri="{FF2B5EF4-FFF2-40B4-BE49-F238E27FC236}">
+                  <a16:creationId xmlns:a16="http://schemas.microsoft.com/office/drawing/2014/main" id="{5A855FC1-205C-4073-9782-5BD10D96E9A3}"/>
+                </a:ext>
+              </a:extLst>
+            </p:cNvPr>
+            <p:cNvSpPr txBox="1"/>
+            <p:nvPr/>
+          </p:nvSpPr>
+          <p:spPr>
+            <a:xfrm>
+              <a:off x="1399592" y="4914076"/>
+              <a:ext cx="7183377" cy="369332"/>
+            </a:xfrm>
+            <a:prstGeom prst="rect">
+              <a:avLst/>
+            </a:prstGeom>
+            <a:noFill/>
+          </p:spPr>
+          <p:txBody>
+            <a:bodyPr wrap="none" rtlCol="0">
+              <a:spAutoFit/>
+            </a:bodyPr>
+            <a:lstStyle/>
+            <a:p>
+              <a:r>
+                <a:rPr lang="en-US" altLang="ko-KR" dirty="0">
+                  <a:latin typeface="나눔스퀘어OTF_ac Bold" panose="020B0600000101010101" pitchFamily="34" charset="-127"/>
+                  <a:ea typeface="나눔스퀘어OTF_ac Bold" panose="020B0600000101010101" pitchFamily="34" charset="-127"/>
+                </a:rPr>
+                <a:t>3. </a:t>
+              </a:r>
+              <a:r>
+                <a:rPr lang="ko-KR" altLang="en-US" dirty="0">
+                  <a:latin typeface="나눔스퀘어OTF_ac Bold" panose="020B0600000101010101" pitchFamily="34" charset="-127"/>
+                  <a:ea typeface="나눔스퀘어OTF_ac Bold" panose="020B0600000101010101" pitchFamily="34" charset="-127"/>
+                </a:rPr>
+                <a:t>프리랜서</a:t>
+              </a:r>
+              <a:r>
+                <a:rPr lang="en-US" altLang="ko-KR" dirty="0">
+                  <a:latin typeface="나눔스퀘어OTF_ac Bold" panose="020B0600000101010101" pitchFamily="34" charset="-127"/>
+                  <a:ea typeface="나눔스퀘어OTF_ac Bold" panose="020B0600000101010101" pitchFamily="34" charset="-127"/>
+                </a:rPr>
+                <a:t>, </a:t>
+              </a:r>
+              <a:r>
+                <a:rPr lang="ko-KR" altLang="en-US" dirty="0">
+                  <a:latin typeface="나눔스퀘어OTF_ac Bold" panose="020B0600000101010101" pitchFamily="34" charset="-127"/>
+                  <a:ea typeface="나눔스퀘어OTF_ac Bold" panose="020B0600000101010101" pitchFamily="34" charset="-127"/>
+                </a:rPr>
+                <a:t>임직원 구조 불문하고 </a:t>
+              </a:r>
+              <a:r>
+                <a:rPr lang="en-US" altLang="ko-KR" dirty="0">
+                  <a:latin typeface="나눔스퀘어OTF_ac Bold" panose="020B0600000101010101" pitchFamily="34" charset="-127"/>
+                  <a:ea typeface="나눔스퀘어OTF_ac Bold" panose="020B0600000101010101" pitchFamily="34" charset="-127"/>
+                </a:rPr>
+                <a:t>1</a:t>
+              </a:r>
+              <a:r>
+                <a:rPr lang="ko-KR" altLang="en-US" dirty="0">
+                  <a:latin typeface="나눔스퀘어OTF_ac Bold" panose="020B0600000101010101" pitchFamily="34" charset="-127"/>
+                  <a:ea typeface="나눔스퀘어OTF_ac Bold" panose="020B0600000101010101" pitchFamily="34" charset="-127"/>
+                </a:rPr>
+                <a:t>시간당 트레이너 </a:t>
+              </a:r>
+              <a:r>
+                <a:rPr lang="en-US" altLang="ko-KR" dirty="0">
+                  <a:latin typeface="나눔스퀘어OTF_ac Bold" panose="020B0600000101010101" pitchFamily="34" charset="-127"/>
+                  <a:ea typeface="나눔스퀘어OTF_ac Bold" panose="020B0600000101010101" pitchFamily="34" charset="-127"/>
+                </a:rPr>
+                <a:t>1</a:t>
+              </a:r>
+              <a:r>
+                <a:rPr lang="ko-KR" altLang="en-US" dirty="0">
+                  <a:latin typeface="나눔스퀘어OTF_ac Bold" panose="020B0600000101010101" pitchFamily="34" charset="-127"/>
+                  <a:ea typeface="나눔스퀘어OTF_ac Bold" panose="020B0600000101010101" pitchFamily="34" charset="-127"/>
+                </a:rPr>
+                <a:t>명만 고용 필수</a:t>
+              </a:r>
+              <a:r>
+                <a:rPr lang="en-US" altLang="ko-KR" dirty="0">
+                  <a:latin typeface="나눔스퀘어OTF_ac Bold" panose="020B0600000101010101" pitchFamily="34" charset="-127"/>
+                  <a:ea typeface="나눔스퀘어OTF_ac Bold" panose="020B0600000101010101" pitchFamily="34" charset="-127"/>
+                </a:rPr>
+                <a:t>(</a:t>
+              </a:r>
+              <a:r>
+                <a:rPr lang="ko-KR" altLang="en-US" dirty="0" err="1">
+                  <a:latin typeface="나눔스퀘어OTF_ac Bold" panose="020B0600000101010101" pitchFamily="34" charset="-127"/>
+                  <a:ea typeface="나눔스퀘어OTF_ac Bold" panose="020B0600000101010101" pitchFamily="34" charset="-127"/>
+                </a:rPr>
+                <a:t>신고제</a:t>
+              </a:r>
+              <a:r>
+                <a:rPr lang="en-US" altLang="ko-KR" dirty="0">
+                  <a:latin typeface="나눔스퀘어OTF_ac Bold" panose="020B0600000101010101" pitchFamily="34" charset="-127"/>
+                  <a:ea typeface="나눔스퀘어OTF_ac Bold" panose="020B0600000101010101" pitchFamily="34" charset="-127"/>
+                </a:rPr>
+                <a:t>)</a:t>
+              </a:r>
+              <a:endParaRPr lang="ko-KR" altLang="en-US" dirty="0">
+                <a:latin typeface="나눔스퀘어OTF_ac Bold" panose="020B0600000101010101" pitchFamily="34" charset="-127"/>
+                <a:ea typeface="나눔스퀘어OTF_ac Bold" panose="020B0600000101010101" pitchFamily="34" charset="-127"/>
+              </a:endParaRPr>
+            </a:p>
+          </p:txBody>
+        </p:sp>
+      </p:grpSp>
+      <p:sp>
+        <p:nvSpPr>
+          <p:cNvPr id="50" name="TextBox 49">
+            <a:extLst>
+              <a:ext uri="{FF2B5EF4-FFF2-40B4-BE49-F238E27FC236}">
+                <a16:creationId xmlns:a16="http://schemas.microsoft.com/office/drawing/2014/main" id="{1F3A6DCD-DEEC-4057-A8DB-C377A679DE3B}"/>
+              </a:ext>
+            </a:extLst>
+          </p:cNvPr>
+          <p:cNvSpPr txBox="1"/>
+          <p:nvPr/>
+        </p:nvSpPr>
+        <p:spPr>
+          <a:xfrm>
+            <a:off x="870080" y="1905160"/>
+            <a:ext cx="6162868" cy="369332"/>
+          </a:xfrm>
+          <a:prstGeom prst="rect">
+            <a:avLst/>
+          </a:prstGeom>
+          <a:noFill/>
+        </p:spPr>
+        <p:txBody>
+          <a:bodyPr wrap="square">
+            <a:spAutoFit/>
+          </a:bodyPr>
+          <a:lstStyle/>
+          <a:p>
+            <a:r>
+              <a:rPr lang="ko-KR" altLang="en-US" sz="1800" dirty="0">
+                <a:latin typeface="나눔스퀘어OTF ExtraBold" panose="020B0600000101010101" pitchFamily="34" charset="-127"/>
+                <a:ea typeface="나눔스퀘어OTF ExtraBold" panose="020B0600000101010101" pitchFamily="34" charset="-127"/>
+              </a:rPr>
+              <a:t>①</a:t>
+            </a:r>
+            <a:r>
+              <a:rPr lang="en-US" altLang="ko-KR" sz="1800" dirty="0">
+                <a:latin typeface="나눔스퀘어OTF ExtraBold" panose="020B0600000101010101" pitchFamily="34" charset="-127"/>
+                <a:ea typeface="나눔스퀘어OTF ExtraBold" panose="020B0600000101010101" pitchFamily="34" charset="-127"/>
+              </a:rPr>
+              <a:t> </a:t>
+            </a:r>
+            <a:r>
+              <a:rPr lang="ko-KR" altLang="en-US" sz="1800" dirty="0">
+                <a:latin typeface="나눔스퀘어OTF ExtraBold" panose="020B0600000101010101" pitchFamily="34" charset="-127"/>
+                <a:ea typeface="나눔스퀘어OTF ExtraBold" panose="020B0600000101010101" pitchFamily="34" charset="-127"/>
+              </a:rPr>
+              <a:t>코로나 </a:t>
+            </a:r>
+            <a:r>
+              <a:rPr lang="en-US" altLang="ko-KR" sz="1800" dirty="0">
+                <a:latin typeface="나눔스퀘어OTF ExtraBold" panose="020B0600000101010101" pitchFamily="34" charset="-127"/>
+                <a:ea typeface="나눔스퀘어OTF ExtraBold" panose="020B0600000101010101" pitchFamily="34" charset="-127"/>
+              </a:rPr>
+              <a:t>19 </a:t>
+            </a:r>
+            <a:r>
+              <a:rPr lang="ko-KR" altLang="en-US" sz="1800" dirty="0">
+                <a:latin typeface="나눔스퀘어OTF ExtraBold" panose="020B0600000101010101" pitchFamily="34" charset="-127"/>
+                <a:ea typeface="나눔스퀘어OTF ExtraBold" panose="020B0600000101010101" pitchFamily="34" charset="-127"/>
+              </a:rPr>
+              <a:t>관련 시설 운영 지침 공표 제시</a:t>
+            </a:r>
+            <a:endParaRPr lang="ko-KR" altLang="en-US" dirty="0"/>
+          </a:p>
+        </p:txBody>
+      </p:sp>
     </p:spTree>
     <p:extLst>
       <p:ext uri="{BB962C8B-B14F-4D97-AF65-F5344CB8AC3E}">
@@ -13240,6 +13622,899 @@
 </file>
 
 <file path=ppt/slides/slide15.xml><?xml version="1.0" encoding="utf-8"?>
+<p:sld xmlns:a="http://schemas.openxmlformats.org/drawingml/2006/main" xmlns:r="http://schemas.openxmlformats.org/officeDocument/2006/relationships" xmlns:p="http://schemas.openxmlformats.org/presentationml/2006/main">
+  <p:cSld>
+    <p:spTree>
+      <p:nvGrpSpPr>
+        <p:cNvPr id="1" name=""/>
+        <p:cNvGrpSpPr/>
+        <p:nvPr/>
+      </p:nvGrpSpPr>
+      <p:grpSpPr>
+        <a:xfrm>
+          <a:off x="0" y="0"/>
+          <a:ext cx="0" cy="0"/>
+          <a:chOff x="0" y="0"/>
+          <a:chExt cx="0" cy="0"/>
+        </a:xfrm>
+      </p:grpSpPr>
+      <p:sp>
+        <p:nvSpPr>
+          <p:cNvPr id="12" name="TextBox 11">
+            <a:extLst>
+              <a:ext uri="{FF2B5EF4-FFF2-40B4-BE49-F238E27FC236}">
+                <a16:creationId xmlns:a16="http://schemas.microsoft.com/office/drawing/2014/main" id="{9C65C446-6B9A-48DE-84C7-0CD3C269CDBD}"/>
+              </a:ext>
+            </a:extLst>
+          </p:cNvPr>
+          <p:cNvSpPr txBox="1"/>
+          <p:nvPr/>
+        </p:nvSpPr>
+        <p:spPr>
+          <a:xfrm>
+            <a:off x="867315" y="1905905"/>
+            <a:ext cx="7147682" cy="369332"/>
+          </a:xfrm>
+          <a:prstGeom prst="rect">
+            <a:avLst/>
+          </a:prstGeom>
+          <a:noFill/>
+        </p:spPr>
+        <p:txBody>
+          <a:bodyPr wrap="square">
+            <a:spAutoFit/>
+          </a:bodyPr>
+          <a:lstStyle/>
+          <a:p>
+            <a:r>
+              <a:rPr lang="ko-KR" altLang="en-US" sz="1800" dirty="0">
+                <a:latin typeface="나눔스퀘어OTF ExtraBold" panose="020B0600000101010101" pitchFamily="34" charset="-127"/>
+                <a:ea typeface="나눔스퀘어OTF ExtraBold" panose="020B0600000101010101" pitchFamily="34" charset="-127"/>
+              </a:rPr>
+              <a:t>② 체육 분야 관련 표준계약서 작성시 </a:t>
+            </a:r>
+            <a:r>
+              <a:rPr lang="ko-KR" altLang="en-US" dirty="0">
+                <a:latin typeface="나눔스퀘어OTF ExtraBold" panose="020B0600000101010101" pitchFamily="34" charset="-127"/>
+                <a:ea typeface="나눔스퀘어OTF ExtraBold" panose="020B0600000101010101" pitchFamily="34" charset="-127"/>
+              </a:rPr>
+              <a:t>소비자 권익 보호 영상 필수 시청 제안</a:t>
+            </a:r>
+            <a:endParaRPr lang="ko-KR" altLang="en-US" dirty="0"/>
+          </a:p>
+        </p:txBody>
+      </p:sp>
+      <p:cxnSp>
+        <p:nvCxnSpPr>
+          <p:cNvPr id="16" name="직선 연결선 15">
+            <a:extLst>
+              <a:ext uri="{FF2B5EF4-FFF2-40B4-BE49-F238E27FC236}">
+                <a16:creationId xmlns:a16="http://schemas.microsoft.com/office/drawing/2014/main" id="{EA463FB2-820C-4A03-886F-7759B314EDF1}"/>
+              </a:ext>
+            </a:extLst>
+          </p:cNvPr>
+          <p:cNvCxnSpPr>
+            <a:cxnSpLocks/>
+          </p:cNvCxnSpPr>
+          <p:nvPr/>
+        </p:nvCxnSpPr>
+        <p:spPr>
+          <a:xfrm>
+            <a:off x="65317" y="886408"/>
+            <a:ext cx="12055148" cy="0"/>
+          </a:xfrm>
+          <a:prstGeom prst="line">
+            <a:avLst/>
+          </a:prstGeom>
+          <a:ln w="76200">
+            <a:solidFill>
+              <a:schemeClr val="accent2"/>
+            </a:solidFill>
+          </a:ln>
+        </p:spPr>
+        <p:style>
+          <a:lnRef idx="1">
+            <a:schemeClr val="accent1"/>
+          </a:lnRef>
+          <a:fillRef idx="0">
+            <a:schemeClr val="accent1"/>
+          </a:fillRef>
+          <a:effectRef idx="0">
+            <a:schemeClr val="accent1"/>
+          </a:effectRef>
+          <a:fontRef idx="minor">
+            <a:schemeClr val="tx1"/>
+          </a:fontRef>
+        </p:style>
+      </p:cxnSp>
+      <p:sp>
+        <p:nvSpPr>
+          <p:cNvPr id="28" name="부제목 2">
+            <a:extLst>
+              <a:ext uri="{FF2B5EF4-FFF2-40B4-BE49-F238E27FC236}">
+                <a16:creationId xmlns:a16="http://schemas.microsoft.com/office/drawing/2014/main" id="{D3404BBB-A882-43CB-BDE9-94309BF99B80}"/>
+              </a:ext>
+            </a:extLst>
+          </p:cNvPr>
+          <p:cNvSpPr txBox="1">
+            <a:spLocks/>
+          </p:cNvSpPr>
+          <p:nvPr/>
+        </p:nvSpPr>
+        <p:spPr>
+          <a:xfrm>
+            <a:off x="219351" y="105714"/>
+            <a:ext cx="11827946" cy="694929"/>
+          </a:xfrm>
+          <a:prstGeom prst="rect">
+            <a:avLst/>
+          </a:prstGeom>
+        </p:spPr>
+        <p:txBody>
+          <a:bodyPr>
+            <a:noAutofit/>
+          </a:bodyPr>
+          <a:lstStyle>
+            <a:lvl1pPr marL="228600" indent="-228600" algn="l" defTabSz="914400" rtl="0" eaLnBrk="1" latinLnBrk="1" hangingPunct="1">
+              <a:lnSpc>
+                <a:spcPct val="90000"/>
+              </a:lnSpc>
+              <a:spcBef>
+                <a:spcPts val="1000"/>
+              </a:spcBef>
+              <a:buFont typeface="Arial" panose="020B0604020202020204" pitchFamily="34" charset="0"/>
+              <a:buChar char="•"/>
+              <a:defRPr sz="2800" kern="1200">
+                <a:solidFill>
+                  <a:schemeClr val="tx1"/>
+                </a:solidFill>
+                <a:latin typeface="+mn-lt"/>
+                <a:ea typeface="+mn-ea"/>
+                <a:cs typeface="+mn-cs"/>
+              </a:defRPr>
+            </a:lvl1pPr>
+            <a:lvl2pPr marL="685800" indent="-228600" algn="l" defTabSz="914400" rtl="0" eaLnBrk="1" latinLnBrk="1" hangingPunct="1">
+              <a:lnSpc>
+                <a:spcPct val="90000"/>
+              </a:lnSpc>
+              <a:spcBef>
+                <a:spcPts val="500"/>
+              </a:spcBef>
+              <a:buFont typeface="Arial" panose="020B0604020202020204" pitchFamily="34" charset="0"/>
+              <a:buChar char="•"/>
+              <a:defRPr sz="2400" kern="1200">
+                <a:solidFill>
+                  <a:schemeClr val="tx1"/>
+                </a:solidFill>
+                <a:latin typeface="+mn-lt"/>
+                <a:ea typeface="+mn-ea"/>
+                <a:cs typeface="+mn-cs"/>
+              </a:defRPr>
+            </a:lvl2pPr>
+            <a:lvl3pPr marL="1143000" indent="-228600" algn="l" defTabSz="914400" rtl="0" eaLnBrk="1" latinLnBrk="1" hangingPunct="1">
+              <a:lnSpc>
+                <a:spcPct val="90000"/>
+              </a:lnSpc>
+              <a:spcBef>
+                <a:spcPts val="500"/>
+              </a:spcBef>
+              <a:buFont typeface="Arial" panose="020B0604020202020204" pitchFamily="34" charset="0"/>
+              <a:buChar char="•"/>
+              <a:defRPr sz="2000" kern="1200">
+                <a:solidFill>
+                  <a:schemeClr val="tx1"/>
+                </a:solidFill>
+                <a:latin typeface="+mn-lt"/>
+                <a:ea typeface="+mn-ea"/>
+                <a:cs typeface="+mn-cs"/>
+              </a:defRPr>
+            </a:lvl3pPr>
+            <a:lvl4pPr marL="1600200" indent="-228600" algn="l" defTabSz="914400" rtl="0" eaLnBrk="1" latinLnBrk="1" hangingPunct="1">
+              <a:lnSpc>
+                <a:spcPct val="90000"/>
+              </a:lnSpc>
+              <a:spcBef>
+                <a:spcPts val="500"/>
+              </a:spcBef>
+              <a:buFont typeface="Arial" panose="020B0604020202020204" pitchFamily="34" charset="0"/>
+              <a:buChar char="•"/>
+              <a:defRPr sz="1800" kern="1200">
+                <a:solidFill>
+                  <a:schemeClr val="tx1"/>
+                </a:solidFill>
+                <a:latin typeface="+mn-lt"/>
+                <a:ea typeface="+mn-ea"/>
+                <a:cs typeface="+mn-cs"/>
+              </a:defRPr>
+            </a:lvl4pPr>
+            <a:lvl5pPr marL="2057400" indent="-228600" algn="l" defTabSz="914400" rtl="0" eaLnBrk="1" latinLnBrk="1" hangingPunct="1">
+              <a:lnSpc>
+                <a:spcPct val="90000"/>
+              </a:lnSpc>
+              <a:spcBef>
+                <a:spcPts val="500"/>
+              </a:spcBef>
+              <a:buFont typeface="Arial" panose="020B0604020202020204" pitchFamily="34" charset="0"/>
+              <a:buChar char="•"/>
+              <a:defRPr sz="1800" kern="1200">
+                <a:solidFill>
+                  <a:schemeClr val="tx1"/>
+                </a:solidFill>
+                <a:latin typeface="+mn-lt"/>
+                <a:ea typeface="+mn-ea"/>
+                <a:cs typeface="+mn-cs"/>
+              </a:defRPr>
+            </a:lvl5pPr>
+            <a:lvl6pPr marL="2514600" indent="-228600" algn="l" defTabSz="914400" rtl="0" eaLnBrk="1" latinLnBrk="1" hangingPunct="1">
+              <a:lnSpc>
+                <a:spcPct val="90000"/>
+              </a:lnSpc>
+              <a:spcBef>
+                <a:spcPts val="500"/>
+              </a:spcBef>
+              <a:buFont typeface="Arial" panose="020B0604020202020204" pitchFamily="34" charset="0"/>
+              <a:buChar char="•"/>
+              <a:defRPr sz="1800" kern="1200">
+                <a:solidFill>
+                  <a:schemeClr val="tx1"/>
+                </a:solidFill>
+                <a:latin typeface="+mn-lt"/>
+                <a:ea typeface="+mn-ea"/>
+                <a:cs typeface="+mn-cs"/>
+              </a:defRPr>
+            </a:lvl6pPr>
+            <a:lvl7pPr marL="2971800" indent="-228600" algn="l" defTabSz="914400" rtl="0" eaLnBrk="1" latinLnBrk="1" hangingPunct="1">
+              <a:lnSpc>
+                <a:spcPct val="90000"/>
+              </a:lnSpc>
+              <a:spcBef>
+                <a:spcPts val="500"/>
+              </a:spcBef>
+              <a:buFont typeface="Arial" panose="020B0604020202020204" pitchFamily="34" charset="0"/>
+              <a:buChar char="•"/>
+              <a:defRPr sz="1800" kern="1200">
+                <a:solidFill>
+                  <a:schemeClr val="tx1"/>
+                </a:solidFill>
+                <a:latin typeface="+mn-lt"/>
+                <a:ea typeface="+mn-ea"/>
+                <a:cs typeface="+mn-cs"/>
+              </a:defRPr>
+            </a:lvl7pPr>
+            <a:lvl8pPr marL="3429000" indent="-228600" algn="l" defTabSz="914400" rtl="0" eaLnBrk="1" latinLnBrk="1" hangingPunct="1">
+              <a:lnSpc>
+                <a:spcPct val="90000"/>
+              </a:lnSpc>
+              <a:spcBef>
+                <a:spcPts val="500"/>
+              </a:spcBef>
+              <a:buFont typeface="Arial" panose="020B0604020202020204" pitchFamily="34" charset="0"/>
+              <a:buChar char="•"/>
+              <a:defRPr sz="1800" kern="1200">
+                <a:solidFill>
+                  <a:schemeClr val="tx1"/>
+                </a:solidFill>
+                <a:latin typeface="+mn-lt"/>
+                <a:ea typeface="+mn-ea"/>
+                <a:cs typeface="+mn-cs"/>
+              </a:defRPr>
+            </a:lvl8pPr>
+            <a:lvl9pPr marL="3886200" indent="-228600" algn="l" defTabSz="914400" rtl="0" eaLnBrk="1" latinLnBrk="1" hangingPunct="1">
+              <a:lnSpc>
+                <a:spcPct val="90000"/>
+              </a:lnSpc>
+              <a:spcBef>
+                <a:spcPts val="500"/>
+              </a:spcBef>
+              <a:buFont typeface="Arial" panose="020B0604020202020204" pitchFamily="34" charset="0"/>
+              <a:buChar char="•"/>
+              <a:defRPr sz="1800" kern="1200">
+                <a:solidFill>
+                  <a:schemeClr val="tx1"/>
+                </a:solidFill>
+                <a:latin typeface="+mn-lt"/>
+                <a:ea typeface="+mn-ea"/>
+                <a:cs typeface="+mn-cs"/>
+              </a:defRPr>
+            </a:lvl9pPr>
+          </a:lstStyle>
+          <a:p>
+            <a:pPr marL="0" indent="0">
+              <a:buNone/>
+            </a:pPr>
+            <a:r>
+              <a:rPr lang="ko-KR" altLang="en-US" sz="4400" dirty="0">
+                <a:latin typeface="나눔스퀘어OTF ExtraBold" panose="020B0600000101010101" pitchFamily="34" charset="-127"/>
+                <a:ea typeface="나눔스퀘어OTF ExtraBold" panose="020B0600000101010101" pitchFamily="34" charset="-127"/>
+              </a:rPr>
+              <a:t>다</a:t>
+            </a:r>
+            <a:r>
+              <a:rPr lang="en-US" altLang="ko-KR" sz="4400" dirty="0">
+                <a:latin typeface="나눔스퀘어OTF ExtraBold" panose="020B0600000101010101" pitchFamily="34" charset="-127"/>
+                <a:ea typeface="나눔스퀘어OTF ExtraBold" panose="020B0600000101010101" pitchFamily="34" charset="-127"/>
+              </a:rPr>
+              <a:t>. </a:t>
+            </a:r>
+            <a:r>
+              <a:rPr lang="ko-KR" altLang="en-US" sz="4400" dirty="0">
+                <a:latin typeface="나눔스퀘어OTF ExtraBold" panose="020B0600000101010101" pitchFamily="34" charset="-127"/>
+                <a:ea typeface="나눔스퀘어OTF ExtraBold" panose="020B0600000101010101" pitchFamily="34" charset="-127"/>
+              </a:rPr>
+              <a:t>개선안 제안</a:t>
+            </a:r>
+          </a:p>
+        </p:txBody>
+      </p:sp>
+      <p:sp>
+        <p:nvSpPr>
+          <p:cNvPr id="43" name="부제목 2">
+            <a:extLst>
+              <a:ext uri="{FF2B5EF4-FFF2-40B4-BE49-F238E27FC236}">
+                <a16:creationId xmlns:a16="http://schemas.microsoft.com/office/drawing/2014/main" id="{DA55C265-F4E2-4C08-A937-C0A9D836633E}"/>
+              </a:ext>
+            </a:extLst>
+          </p:cNvPr>
+          <p:cNvSpPr txBox="1">
+            <a:spLocks/>
+          </p:cNvSpPr>
+          <p:nvPr/>
+        </p:nvSpPr>
+        <p:spPr>
+          <a:xfrm>
+            <a:off x="182027" y="972174"/>
+            <a:ext cx="2738455" cy="400110"/>
+          </a:xfrm>
+          <a:prstGeom prst="rect">
+            <a:avLst/>
+          </a:prstGeom>
+        </p:spPr>
+        <p:txBody>
+          <a:bodyPr>
+            <a:noAutofit/>
+          </a:bodyPr>
+          <a:lstStyle>
+            <a:lvl1pPr marL="228600" indent="-228600" algn="l" defTabSz="914400" rtl="0" eaLnBrk="1" latinLnBrk="1" hangingPunct="1">
+              <a:lnSpc>
+                <a:spcPct val="90000"/>
+              </a:lnSpc>
+              <a:spcBef>
+                <a:spcPts val="1000"/>
+              </a:spcBef>
+              <a:buFont typeface="Arial" panose="020B0604020202020204" pitchFamily="34" charset="0"/>
+              <a:buChar char="•"/>
+              <a:defRPr sz="2800" kern="1200">
+                <a:solidFill>
+                  <a:schemeClr val="tx1"/>
+                </a:solidFill>
+                <a:latin typeface="+mn-lt"/>
+                <a:ea typeface="+mn-ea"/>
+                <a:cs typeface="+mn-cs"/>
+              </a:defRPr>
+            </a:lvl1pPr>
+            <a:lvl2pPr marL="685800" indent="-228600" algn="l" defTabSz="914400" rtl="0" eaLnBrk="1" latinLnBrk="1" hangingPunct="1">
+              <a:lnSpc>
+                <a:spcPct val="90000"/>
+              </a:lnSpc>
+              <a:spcBef>
+                <a:spcPts val="500"/>
+              </a:spcBef>
+              <a:buFont typeface="Arial" panose="020B0604020202020204" pitchFamily="34" charset="0"/>
+              <a:buChar char="•"/>
+              <a:defRPr sz="2400" kern="1200">
+                <a:solidFill>
+                  <a:schemeClr val="tx1"/>
+                </a:solidFill>
+                <a:latin typeface="+mn-lt"/>
+                <a:ea typeface="+mn-ea"/>
+                <a:cs typeface="+mn-cs"/>
+              </a:defRPr>
+            </a:lvl2pPr>
+            <a:lvl3pPr marL="1143000" indent="-228600" algn="l" defTabSz="914400" rtl="0" eaLnBrk="1" latinLnBrk="1" hangingPunct="1">
+              <a:lnSpc>
+                <a:spcPct val="90000"/>
+              </a:lnSpc>
+              <a:spcBef>
+                <a:spcPts val="500"/>
+              </a:spcBef>
+              <a:buFont typeface="Arial" panose="020B0604020202020204" pitchFamily="34" charset="0"/>
+              <a:buChar char="•"/>
+              <a:defRPr sz="2000" kern="1200">
+                <a:solidFill>
+                  <a:schemeClr val="tx1"/>
+                </a:solidFill>
+                <a:latin typeface="+mn-lt"/>
+                <a:ea typeface="+mn-ea"/>
+                <a:cs typeface="+mn-cs"/>
+              </a:defRPr>
+            </a:lvl3pPr>
+            <a:lvl4pPr marL="1600200" indent="-228600" algn="l" defTabSz="914400" rtl="0" eaLnBrk="1" latinLnBrk="1" hangingPunct="1">
+              <a:lnSpc>
+                <a:spcPct val="90000"/>
+              </a:lnSpc>
+              <a:spcBef>
+                <a:spcPts val="500"/>
+              </a:spcBef>
+              <a:buFont typeface="Arial" panose="020B0604020202020204" pitchFamily="34" charset="0"/>
+              <a:buChar char="•"/>
+              <a:defRPr sz="1800" kern="1200">
+                <a:solidFill>
+                  <a:schemeClr val="tx1"/>
+                </a:solidFill>
+                <a:latin typeface="+mn-lt"/>
+                <a:ea typeface="+mn-ea"/>
+                <a:cs typeface="+mn-cs"/>
+              </a:defRPr>
+            </a:lvl4pPr>
+            <a:lvl5pPr marL="2057400" indent="-228600" algn="l" defTabSz="914400" rtl="0" eaLnBrk="1" latinLnBrk="1" hangingPunct="1">
+              <a:lnSpc>
+                <a:spcPct val="90000"/>
+              </a:lnSpc>
+              <a:spcBef>
+                <a:spcPts val="500"/>
+              </a:spcBef>
+              <a:buFont typeface="Arial" panose="020B0604020202020204" pitchFamily="34" charset="0"/>
+              <a:buChar char="•"/>
+              <a:defRPr sz="1800" kern="1200">
+                <a:solidFill>
+                  <a:schemeClr val="tx1"/>
+                </a:solidFill>
+                <a:latin typeface="+mn-lt"/>
+                <a:ea typeface="+mn-ea"/>
+                <a:cs typeface="+mn-cs"/>
+              </a:defRPr>
+            </a:lvl5pPr>
+            <a:lvl6pPr marL="2514600" indent="-228600" algn="l" defTabSz="914400" rtl="0" eaLnBrk="1" latinLnBrk="1" hangingPunct="1">
+              <a:lnSpc>
+                <a:spcPct val="90000"/>
+              </a:lnSpc>
+              <a:spcBef>
+                <a:spcPts val="500"/>
+              </a:spcBef>
+              <a:buFont typeface="Arial" panose="020B0604020202020204" pitchFamily="34" charset="0"/>
+              <a:buChar char="•"/>
+              <a:defRPr sz="1800" kern="1200">
+                <a:solidFill>
+                  <a:schemeClr val="tx1"/>
+                </a:solidFill>
+                <a:latin typeface="+mn-lt"/>
+                <a:ea typeface="+mn-ea"/>
+                <a:cs typeface="+mn-cs"/>
+              </a:defRPr>
+            </a:lvl6pPr>
+            <a:lvl7pPr marL="2971800" indent="-228600" algn="l" defTabSz="914400" rtl="0" eaLnBrk="1" latinLnBrk="1" hangingPunct="1">
+              <a:lnSpc>
+                <a:spcPct val="90000"/>
+              </a:lnSpc>
+              <a:spcBef>
+                <a:spcPts val="500"/>
+              </a:spcBef>
+              <a:buFont typeface="Arial" panose="020B0604020202020204" pitchFamily="34" charset="0"/>
+              <a:buChar char="•"/>
+              <a:defRPr sz="1800" kern="1200">
+                <a:solidFill>
+                  <a:schemeClr val="tx1"/>
+                </a:solidFill>
+                <a:latin typeface="+mn-lt"/>
+                <a:ea typeface="+mn-ea"/>
+                <a:cs typeface="+mn-cs"/>
+              </a:defRPr>
+            </a:lvl7pPr>
+            <a:lvl8pPr marL="3429000" indent="-228600" algn="l" defTabSz="914400" rtl="0" eaLnBrk="1" latinLnBrk="1" hangingPunct="1">
+              <a:lnSpc>
+                <a:spcPct val="90000"/>
+              </a:lnSpc>
+              <a:spcBef>
+                <a:spcPts val="500"/>
+              </a:spcBef>
+              <a:buFont typeface="Arial" panose="020B0604020202020204" pitchFamily="34" charset="0"/>
+              <a:buChar char="•"/>
+              <a:defRPr sz="1800" kern="1200">
+                <a:solidFill>
+                  <a:schemeClr val="tx1"/>
+                </a:solidFill>
+                <a:latin typeface="+mn-lt"/>
+                <a:ea typeface="+mn-ea"/>
+                <a:cs typeface="+mn-cs"/>
+              </a:defRPr>
+            </a:lvl8pPr>
+            <a:lvl9pPr marL="3886200" indent="-228600" algn="l" defTabSz="914400" rtl="0" eaLnBrk="1" latinLnBrk="1" hangingPunct="1">
+              <a:lnSpc>
+                <a:spcPct val="90000"/>
+              </a:lnSpc>
+              <a:spcBef>
+                <a:spcPts val="500"/>
+              </a:spcBef>
+              <a:buFont typeface="Arial" panose="020B0604020202020204" pitchFamily="34" charset="0"/>
+              <a:buChar char="•"/>
+              <a:defRPr sz="1800" kern="1200">
+                <a:solidFill>
+                  <a:schemeClr val="tx1"/>
+                </a:solidFill>
+                <a:latin typeface="+mn-lt"/>
+                <a:ea typeface="+mn-ea"/>
+                <a:cs typeface="+mn-cs"/>
+              </a:defRPr>
+            </a:lvl9pPr>
+          </a:lstStyle>
+          <a:p>
+            <a:pPr marL="0" indent="0">
+              <a:buNone/>
+            </a:pPr>
+            <a:r>
+              <a:rPr lang="en-US" altLang="ko-KR" sz="2400" dirty="0">
+                <a:latin typeface="나눔스퀘어OTF ExtraBold" panose="020B0600000101010101" pitchFamily="34" charset="-127"/>
+                <a:ea typeface="나눔스퀘어OTF ExtraBold" panose="020B0600000101010101" pitchFamily="34" charset="-127"/>
+              </a:rPr>
+              <a:t>-</a:t>
+            </a:r>
+            <a:r>
+              <a:rPr lang="ko-KR" altLang="en-US" sz="2400" dirty="0">
+                <a:latin typeface="나눔스퀘어OTF ExtraBold" panose="020B0600000101010101" pitchFamily="34" charset="-127"/>
+                <a:ea typeface="나눔스퀘어OTF ExtraBold" panose="020B0600000101010101" pitchFamily="34" charset="-127"/>
+              </a:rPr>
+              <a:t> 개선안 및 한계점</a:t>
+            </a:r>
+          </a:p>
+        </p:txBody>
+      </p:sp>
+      <p:grpSp>
+        <p:nvGrpSpPr>
+          <p:cNvPr id="4" name="그룹 3">
+            <a:extLst>
+              <a:ext uri="{FF2B5EF4-FFF2-40B4-BE49-F238E27FC236}">
+                <a16:creationId xmlns:a16="http://schemas.microsoft.com/office/drawing/2014/main" id="{13AE71AD-CB85-46F1-9952-1BE97B129C38}"/>
+              </a:ext>
+            </a:extLst>
+          </p:cNvPr>
+          <p:cNvGrpSpPr/>
+          <p:nvPr/>
+        </p:nvGrpSpPr>
+        <p:grpSpPr>
+          <a:xfrm>
+            <a:off x="1005504" y="3167789"/>
+            <a:ext cx="6257521" cy="707886"/>
+            <a:chOff x="949570" y="3059668"/>
+            <a:chExt cx="6257521" cy="707886"/>
+          </a:xfrm>
+        </p:grpSpPr>
+        <p:sp>
+          <p:nvSpPr>
+            <p:cNvPr id="2" name="TextBox 1">
+              <a:extLst>
+                <a:ext uri="{FF2B5EF4-FFF2-40B4-BE49-F238E27FC236}">
+                  <a16:creationId xmlns:a16="http://schemas.microsoft.com/office/drawing/2014/main" id="{53A537F5-A01F-4977-B48D-0150E905F5E2}"/>
+                </a:ext>
+              </a:extLst>
+            </p:cNvPr>
+            <p:cNvSpPr txBox="1"/>
+            <p:nvPr/>
+          </p:nvSpPr>
+          <p:spPr>
+            <a:xfrm>
+              <a:off x="1495271" y="3429000"/>
+              <a:ext cx="5711820" cy="338554"/>
+            </a:xfrm>
+            <a:prstGeom prst="rect">
+              <a:avLst/>
+            </a:prstGeom>
+            <a:noFill/>
+          </p:spPr>
+          <p:txBody>
+            <a:bodyPr wrap="none" rtlCol="0">
+              <a:spAutoFit/>
+            </a:bodyPr>
+            <a:lstStyle/>
+            <a:p>
+              <a:pPr marL="342900" indent="-342900">
+                <a:buAutoNum type="arabicPeriod"/>
+              </a:pPr>
+              <a:r>
+                <a:rPr lang="ko-KR" altLang="en-US" sz="1600" dirty="0">
+                  <a:latin typeface="나눔스퀘어OTF_ac Bold" panose="020B0600000101010101" pitchFamily="34" charset="-127"/>
+                  <a:ea typeface="나눔스퀘어OTF_ac Bold" panose="020B0600000101010101" pitchFamily="34" charset="-127"/>
+                </a:rPr>
+                <a:t>문화체육관광부</a:t>
+              </a:r>
+              <a:r>
+                <a:rPr lang="en-US" altLang="ko-KR" sz="1600" dirty="0">
+                  <a:latin typeface="나눔스퀘어OTF_ac Bold" panose="020B0600000101010101" pitchFamily="34" charset="-127"/>
+                  <a:ea typeface="나눔스퀘어OTF_ac Bold" panose="020B0600000101010101" pitchFamily="34" charset="-127"/>
+                </a:rPr>
+                <a:t>, </a:t>
+              </a:r>
+              <a:r>
+                <a:rPr lang="ko-KR" altLang="en-US" sz="1600" dirty="0">
+                  <a:latin typeface="나눔스퀘어OTF_ac Bold" panose="020B0600000101010101" pitchFamily="34" charset="-127"/>
+                  <a:ea typeface="나눔스퀘어OTF_ac Bold" panose="020B0600000101010101" pitchFamily="34" charset="-127"/>
+                </a:rPr>
+                <a:t>더불어민주당 박정</a:t>
+              </a:r>
+              <a:r>
+                <a:rPr lang="en-US" altLang="ko-KR" sz="1600" dirty="0">
+                  <a:latin typeface="나눔스퀘어OTF_ac Bold" panose="020B0600000101010101" pitchFamily="34" charset="-127"/>
+                  <a:ea typeface="나눔스퀘어OTF_ac Bold" panose="020B0600000101010101" pitchFamily="34" charset="-127"/>
+                </a:rPr>
+                <a:t> </a:t>
+              </a:r>
+              <a:r>
+                <a:rPr lang="ko-KR" altLang="en-US" sz="1600" dirty="0">
+                  <a:latin typeface="나눔스퀘어OTF_ac Bold" panose="020B0600000101010101" pitchFamily="34" charset="-127"/>
+                  <a:ea typeface="나눔스퀘어OTF_ac Bold" panose="020B0600000101010101" pitchFamily="34" charset="-127"/>
+                </a:rPr>
+                <a:t>의원과 전용기 의원 공동 주최</a:t>
+              </a:r>
+              <a:endParaRPr lang="en-US" altLang="ko-KR" sz="1600" dirty="0">
+                <a:latin typeface="나눔스퀘어OTF_ac Bold" panose="020B0600000101010101" pitchFamily="34" charset="-127"/>
+                <a:ea typeface="나눔스퀘어OTF_ac Bold" panose="020B0600000101010101" pitchFamily="34" charset="-127"/>
+              </a:endParaRPr>
+            </a:p>
+          </p:txBody>
+        </p:sp>
+        <p:sp>
+          <p:nvSpPr>
+            <p:cNvPr id="3" name="TextBox 2">
+              <a:extLst>
+                <a:ext uri="{FF2B5EF4-FFF2-40B4-BE49-F238E27FC236}">
+                  <a16:creationId xmlns:a16="http://schemas.microsoft.com/office/drawing/2014/main" id="{7104DDE8-D7AA-49D5-AF3A-FCAD15A25F94}"/>
+                </a:ext>
+              </a:extLst>
+            </p:cNvPr>
+            <p:cNvSpPr txBox="1"/>
+            <p:nvPr/>
+          </p:nvSpPr>
+          <p:spPr>
+            <a:xfrm>
+              <a:off x="949570" y="3059668"/>
+              <a:ext cx="5998758" cy="369332"/>
+            </a:xfrm>
+            <a:prstGeom prst="rect">
+              <a:avLst/>
+            </a:prstGeom>
+            <a:noFill/>
+          </p:spPr>
+          <p:txBody>
+            <a:bodyPr wrap="none" rtlCol="0">
+              <a:spAutoFit/>
+            </a:bodyPr>
+            <a:lstStyle/>
+            <a:p>
+              <a:r>
+                <a:rPr lang="ko-KR" altLang="en-US" dirty="0">
+                  <a:latin typeface="나눔스퀘어OTF_ac Bold" panose="020B0600000101010101" pitchFamily="34" charset="-127"/>
+                  <a:ea typeface="나눔스퀘어OTF_ac Bold" panose="020B0600000101010101" pitchFamily="34" charset="-127"/>
+                </a:rPr>
+                <a:t>현재</a:t>
+              </a:r>
+              <a:r>
+                <a:rPr lang="en-US" altLang="ko-KR" dirty="0">
+                  <a:latin typeface="나눔스퀘어OTF_ac Bold" panose="020B0600000101010101" pitchFamily="34" charset="-127"/>
+                  <a:ea typeface="나눔스퀘어OTF_ac Bold" panose="020B0600000101010101" pitchFamily="34" charset="-127"/>
+                </a:rPr>
+                <a:t>: </a:t>
+              </a:r>
+              <a:r>
+                <a:rPr lang="ko-KR" altLang="en-US" dirty="0">
+                  <a:latin typeface="나눔스퀘어OTF_ac Bold" panose="020B0600000101010101" pitchFamily="34" charset="-127"/>
+                  <a:ea typeface="나눔스퀘어OTF_ac Bold" panose="020B0600000101010101" pitchFamily="34" charset="-127"/>
+                </a:rPr>
+                <a:t>프로스포츠</a:t>
+              </a:r>
+              <a:r>
+                <a:rPr lang="en-US" altLang="ko-KR" dirty="0">
+                  <a:latin typeface="나눔스퀘어OTF_ac Bold" panose="020B0600000101010101" pitchFamily="34" charset="-127"/>
+                  <a:ea typeface="나눔스퀘어OTF_ac Bold" panose="020B0600000101010101" pitchFamily="34" charset="-127"/>
+                </a:rPr>
+                <a:t>, </a:t>
+              </a:r>
+              <a:r>
+                <a:rPr lang="ko-KR" altLang="en-US" dirty="0">
+                  <a:latin typeface="나눔스퀘어OTF_ac Bold" panose="020B0600000101010101" pitchFamily="34" charset="-127"/>
+                  <a:ea typeface="나눔스퀘어OTF_ac Bold" panose="020B0600000101010101" pitchFamily="34" charset="-127"/>
+                </a:rPr>
+                <a:t>직장운동경기부 </a:t>
+              </a:r>
+              <a:r>
+                <a:rPr lang="en-US" altLang="ko-KR" dirty="0">
+                  <a:latin typeface="나눔스퀘어OTF_ac Bold" panose="020B0600000101010101" pitchFamily="34" charset="-127"/>
+                  <a:ea typeface="나눔스퀘어OTF_ac Bold" panose="020B0600000101010101" pitchFamily="34" charset="-127"/>
+                </a:rPr>
+                <a:t>2</a:t>
+              </a:r>
+              <a:r>
+                <a:rPr lang="ko-KR" altLang="en-US" dirty="0">
+                  <a:latin typeface="나눔스퀘어OTF_ac Bold" panose="020B0600000101010101" pitchFamily="34" charset="-127"/>
+                  <a:ea typeface="나눔스퀘어OTF_ac Bold" panose="020B0600000101010101" pitchFamily="34" charset="-127"/>
+                </a:rPr>
+                <a:t>가지 부문에만 </a:t>
+              </a:r>
+              <a:r>
+                <a:rPr lang="ko-KR" altLang="en-US" dirty="0" err="1">
+                  <a:latin typeface="나눔스퀘어OTF_ac Bold" panose="020B0600000101010101" pitchFamily="34" charset="-127"/>
+                  <a:ea typeface="나눔스퀘어OTF_ac Bold" panose="020B0600000101010101" pitchFamily="34" charset="-127"/>
+                </a:rPr>
+                <a:t>국한되어있다</a:t>
+              </a:r>
+              <a:r>
+                <a:rPr lang="en-US" altLang="ko-KR" dirty="0">
+                  <a:latin typeface="나눔스퀘어OTF_ac Bold" panose="020B0600000101010101" pitchFamily="34" charset="-127"/>
+                  <a:ea typeface="나눔스퀘어OTF_ac Bold" panose="020B0600000101010101" pitchFamily="34" charset="-127"/>
+                </a:rPr>
+                <a:t>.</a:t>
+              </a:r>
+            </a:p>
+          </p:txBody>
+        </p:sp>
+      </p:grpSp>
+      <p:sp>
+        <p:nvSpPr>
+          <p:cNvPr id="9" name="TextBox 8">
+            <a:extLst>
+              <a:ext uri="{FF2B5EF4-FFF2-40B4-BE49-F238E27FC236}">
+                <a16:creationId xmlns:a16="http://schemas.microsoft.com/office/drawing/2014/main" id="{F91CE8AE-1A53-4FFD-A160-8ED622E2D1BF}"/>
+              </a:ext>
+            </a:extLst>
+          </p:cNvPr>
+          <p:cNvSpPr txBox="1"/>
+          <p:nvPr/>
+        </p:nvSpPr>
+        <p:spPr>
+          <a:xfrm>
+            <a:off x="1005504" y="2524251"/>
+            <a:ext cx="10180992" cy="369332"/>
+          </a:xfrm>
+          <a:prstGeom prst="rect">
+            <a:avLst/>
+          </a:prstGeom>
+          <a:noFill/>
+        </p:spPr>
+        <p:txBody>
+          <a:bodyPr wrap="none" rtlCol="0">
+            <a:spAutoFit/>
+          </a:bodyPr>
+          <a:lstStyle/>
+          <a:p>
+            <a:r>
+              <a:rPr lang="ko-KR" altLang="en-US" dirty="0">
+                <a:solidFill>
+                  <a:srgbClr val="FF0000"/>
+                </a:solidFill>
+                <a:highlight>
+                  <a:srgbClr val="00FF00"/>
+                </a:highlight>
+                <a:latin typeface="나눔스퀘어OTF_ac Bold" panose="020B0600000101010101" pitchFamily="34" charset="-127"/>
+                <a:ea typeface="나눔스퀘어OTF_ac Bold" panose="020B0600000101010101" pitchFamily="34" charset="-127"/>
+              </a:rPr>
+              <a:t>문화체육관광부과 국민체육진흥공단은 모든 스포츠 종목에 시간</a:t>
+            </a:r>
+            <a:r>
+              <a:rPr lang="en-US" altLang="ko-KR" dirty="0">
+                <a:solidFill>
+                  <a:srgbClr val="FF0000"/>
+                </a:solidFill>
+                <a:highlight>
+                  <a:srgbClr val="00FF00"/>
+                </a:highlight>
+                <a:latin typeface="나눔스퀘어OTF_ac Bold" panose="020B0600000101010101" pitchFamily="34" charset="-127"/>
+                <a:ea typeface="나눔스퀘어OTF_ac Bold" panose="020B0600000101010101" pitchFamily="34" charset="-127"/>
+              </a:rPr>
+              <a:t>, </a:t>
+            </a:r>
+            <a:r>
+              <a:rPr lang="ko-KR" altLang="en-US" dirty="0">
+                <a:solidFill>
+                  <a:srgbClr val="FF0000"/>
+                </a:solidFill>
+                <a:highlight>
+                  <a:srgbClr val="00FF00"/>
+                </a:highlight>
+                <a:latin typeface="나눔스퀘어OTF_ac Bold" panose="020B0600000101010101" pitchFamily="34" charset="-127"/>
+                <a:ea typeface="나눔스퀘어OTF_ac Bold" panose="020B0600000101010101" pitchFamily="34" charset="-127"/>
+              </a:rPr>
+              <a:t>횟수제에 통일된 </a:t>
+            </a:r>
+            <a:r>
+              <a:rPr lang="en-US" altLang="ko-KR" dirty="0">
+                <a:solidFill>
+                  <a:srgbClr val="FF0000"/>
+                </a:solidFill>
+                <a:highlight>
+                  <a:srgbClr val="00FF00"/>
+                </a:highlight>
+                <a:latin typeface="나눔스퀘어OTF_ac Bold" panose="020B0600000101010101" pitchFamily="34" charset="-127"/>
+                <a:ea typeface="나눔스퀘어OTF_ac Bold" panose="020B0600000101010101" pitchFamily="34" charset="-127"/>
+              </a:rPr>
+              <a:t>2</a:t>
+            </a:r>
+            <a:r>
+              <a:rPr lang="ko-KR" altLang="en-US" dirty="0">
+                <a:solidFill>
+                  <a:srgbClr val="FF0000"/>
+                </a:solidFill>
+                <a:highlight>
+                  <a:srgbClr val="00FF00"/>
+                </a:highlight>
+                <a:latin typeface="나눔스퀘어OTF_ac Bold" panose="020B0600000101010101" pitchFamily="34" charset="-127"/>
+                <a:ea typeface="나눔스퀘어OTF_ac Bold" panose="020B0600000101010101" pitchFamily="34" charset="-127"/>
+              </a:rPr>
+              <a:t>가지 표준계약서를 배포한다</a:t>
+            </a:r>
+            <a:r>
+              <a:rPr lang="en-US" altLang="ko-KR" dirty="0">
+                <a:solidFill>
+                  <a:srgbClr val="FF0000"/>
+                </a:solidFill>
+                <a:highlight>
+                  <a:srgbClr val="00FF00"/>
+                </a:highlight>
+                <a:latin typeface="나눔스퀘어OTF_ac Bold" panose="020B0600000101010101" pitchFamily="34" charset="-127"/>
+                <a:ea typeface="나눔스퀘어OTF_ac Bold" panose="020B0600000101010101" pitchFamily="34" charset="-127"/>
+              </a:rPr>
+              <a:t>.</a:t>
+            </a:r>
+          </a:p>
+        </p:txBody>
+      </p:sp>
+      <p:sp>
+        <p:nvSpPr>
+          <p:cNvPr id="13" name="TextBox 12">
+            <a:extLst>
+              <a:ext uri="{FF2B5EF4-FFF2-40B4-BE49-F238E27FC236}">
+                <a16:creationId xmlns:a16="http://schemas.microsoft.com/office/drawing/2014/main" id="{A84F6C2A-3649-4AC2-896F-84FAE4593CA4}"/>
+              </a:ext>
+            </a:extLst>
+          </p:cNvPr>
+          <p:cNvSpPr txBox="1"/>
+          <p:nvPr/>
+        </p:nvSpPr>
+        <p:spPr>
+          <a:xfrm>
+            <a:off x="431882" y="1458049"/>
+            <a:ext cx="2022069" cy="400110"/>
+          </a:xfrm>
+          <a:prstGeom prst="rect">
+            <a:avLst/>
+          </a:prstGeom>
+          <a:noFill/>
+        </p:spPr>
+        <p:txBody>
+          <a:bodyPr wrap="square">
+            <a:spAutoFit/>
+          </a:bodyPr>
+          <a:lstStyle/>
+          <a:p>
+            <a:pPr marL="285750" indent="-285750">
+              <a:buFont typeface="Wingdings" panose="05000000000000000000" pitchFamily="2" charset="2"/>
+              <a:buChar char="Ø"/>
+            </a:pPr>
+            <a:r>
+              <a:rPr lang="ko-KR" altLang="en-US" sz="2000" dirty="0">
+                <a:latin typeface="나눔스퀘어OTF ExtraBold" panose="020B0600000101010101" pitchFamily="34" charset="-127"/>
+                <a:ea typeface="나눔스퀘어OTF ExtraBold" panose="020B0600000101010101" pitchFamily="34" charset="-127"/>
+              </a:rPr>
+              <a:t>폐업 수 줄이기</a:t>
+            </a:r>
+            <a:endParaRPr lang="en-US" altLang="ko-KR" sz="2000" dirty="0">
+              <a:latin typeface="나눔스퀘어OTF ExtraBold" panose="020B0600000101010101" pitchFamily="34" charset="-127"/>
+              <a:ea typeface="나눔스퀘어OTF ExtraBold" panose="020B0600000101010101" pitchFamily="34" charset="-127"/>
+            </a:endParaRPr>
+          </a:p>
+        </p:txBody>
+      </p:sp>
+    </p:spTree>
+    <p:extLst>
+      <p:ext uri="{BB962C8B-B14F-4D97-AF65-F5344CB8AC3E}">
+        <p14:creationId xmlns:p14="http://schemas.microsoft.com/office/powerpoint/2010/main" val="226177996"/>
+      </p:ext>
+    </p:extLst>
+  </p:cSld>
+  <p:clrMapOvr>
+    <a:masterClrMapping/>
+  </p:clrMapOvr>
+</p:sld>
+</file>
+
+<file path=ppt/slides/slide16.xml><?xml version="1.0" encoding="utf-8"?>
 <p:sld xmlns:a="http://schemas.openxmlformats.org/drawingml/2006/main" xmlns:r="http://schemas.openxmlformats.org/officeDocument/2006/relationships" xmlns:p="http://schemas.openxmlformats.org/presentationml/2006/main">
   <p:cSld>
     <p:spTree>
@@ -13732,10 +15007,10 @@
       </p:sp>
       <p:sp>
         <p:nvSpPr>
-          <p:cNvPr id="44" name="TextBox 43">
+          <p:cNvPr id="8" name="TextBox 7">
             <a:extLst>
               <a:ext uri="{FF2B5EF4-FFF2-40B4-BE49-F238E27FC236}">
-                <a16:creationId xmlns:a16="http://schemas.microsoft.com/office/drawing/2014/main" id="{ED0D1800-22E0-4BCD-8C07-CE52B16A09D4}"/>
+                <a16:creationId xmlns:a16="http://schemas.microsoft.com/office/drawing/2014/main" id="{CCE8F2B9-5032-49BF-AA84-BBC751D806CC}"/>
               </a:ext>
             </a:extLst>
           </p:cNvPr>
@@ -13744,8 +15019,89 @@
         </p:nvSpPr>
         <p:spPr>
           <a:xfrm>
-            <a:off x="441215" y="1458049"/>
-            <a:ext cx="8936393" cy="400110"/>
+            <a:off x="870079" y="1908592"/>
+            <a:ext cx="6920981" cy="369332"/>
+          </a:xfrm>
+          <a:prstGeom prst="rect">
+            <a:avLst/>
+          </a:prstGeom>
+          <a:noFill/>
+        </p:spPr>
+        <p:txBody>
+          <a:bodyPr wrap="square">
+            <a:spAutoFit/>
+          </a:bodyPr>
+          <a:lstStyle/>
+          <a:p>
+            <a:r>
+              <a:rPr lang="ko-KR" altLang="en-US" sz="1800" dirty="0">
+                <a:latin typeface="나눔스퀘어OTF ExtraBold" panose="020B0600000101010101" pitchFamily="34" charset="-127"/>
+                <a:ea typeface="나눔스퀘어OTF ExtraBold" panose="020B0600000101010101" pitchFamily="34" charset="-127"/>
+              </a:rPr>
+              <a:t>③</a:t>
+            </a:r>
+            <a:r>
+              <a:rPr lang="en-US" altLang="ko-KR" sz="1800" dirty="0">
+                <a:latin typeface="나눔스퀘어OTF ExtraBold" panose="020B0600000101010101" pitchFamily="34" charset="-127"/>
+                <a:ea typeface="나눔스퀘어OTF ExtraBold" panose="020B0600000101010101" pitchFamily="34" charset="-127"/>
+              </a:rPr>
+              <a:t> </a:t>
+            </a:r>
+            <a:r>
+              <a:rPr lang="ko-KR" altLang="en-US" sz="1800" dirty="0">
+                <a:latin typeface="나눔스퀘어OTF ExtraBold" panose="020B0600000101010101" pitchFamily="34" charset="-127"/>
+                <a:ea typeface="나눔스퀘어OTF ExtraBold" panose="020B0600000101010101" pitchFamily="34" charset="-127"/>
+              </a:rPr>
+              <a:t>실내 체육 시설 민간 자유업 </a:t>
+            </a:r>
+            <a:r>
+              <a:rPr lang="en-US" altLang="ko-KR" sz="1800" dirty="0">
+                <a:latin typeface="나눔스퀘어OTF ExtraBold" panose="020B0600000101010101" pitchFamily="34" charset="-127"/>
+                <a:ea typeface="나눔스퀘어OTF ExtraBold" panose="020B0600000101010101" pitchFamily="34" charset="-127"/>
+              </a:rPr>
+              <a:t>-&gt; </a:t>
+            </a:r>
+            <a:r>
+              <a:rPr lang="ko-KR" altLang="en-US" sz="1800" dirty="0">
+                <a:latin typeface="나눔스퀘어OTF ExtraBold" panose="020B0600000101010101" pitchFamily="34" charset="-127"/>
+                <a:ea typeface="나눔스퀘어OTF ExtraBold" panose="020B0600000101010101" pitchFamily="34" charset="-127"/>
+              </a:rPr>
+              <a:t>등록</a:t>
+            </a:r>
+            <a:r>
+              <a:rPr lang="en-US" altLang="ko-KR" sz="1800" dirty="0">
+                <a:latin typeface="나눔스퀘어OTF ExtraBold" panose="020B0600000101010101" pitchFamily="34" charset="-127"/>
+                <a:ea typeface="나눔스퀘어OTF ExtraBold" panose="020B0600000101010101" pitchFamily="34" charset="-127"/>
+              </a:rPr>
+              <a:t>/</a:t>
+            </a:r>
+            <a:r>
+              <a:rPr lang="ko-KR" altLang="en-US" sz="1800" dirty="0">
+                <a:latin typeface="나눔스퀘어OTF ExtraBold" panose="020B0600000101010101" pitchFamily="34" charset="-127"/>
+                <a:ea typeface="나눔스퀘어OTF ExtraBold" panose="020B0600000101010101" pitchFamily="34" charset="-127"/>
+              </a:rPr>
+              <a:t>신고 체육 시설 등록 법제화</a:t>
+            </a:r>
+            <a:endParaRPr lang="ko-KR" altLang="en-US" dirty="0"/>
+          </a:p>
+        </p:txBody>
+      </p:sp>
+      <p:sp>
+        <p:nvSpPr>
+          <p:cNvPr id="9" name="TextBox 8">
+            <a:extLst>
+              <a:ext uri="{FF2B5EF4-FFF2-40B4-BE49-F238E27FC236}">
+                <a16:creationId xmlns:a16="http://schemas.microsoft.com/office/drawing/2014/main" id="{537C9F70-4907-4C40-B18E-7DAE16AFD792}"/>
+              </a:ext>
+            </a:extLst>
+          </p:cNvPr>
+          <p:cNvSpPr txBox="1"/>
+          <p:nvPr/>
+        </p:nvSpPr>
+        <p:spPr>
+          <a:xfrm>
+            <a:off x="431882" y="1458049"/>
+            <a:ext cx="2022069" cy="400110"/>
           </a:xfrm>
           <a:prstGeom prst="rect">
             <a:avLst/>
@@ -13767,21 +15123,7 @@
                 <a:latin typeface="나눔스퀘어OTF ExtraBold" panose="020B0600000101010101" pitchFamily="34" charset="-127"/>
                 <a:ea typeface="나눔스퀘어OTF ExtraBold" panose="020B0600000101010101" pitchFamily="34" charset="-127"/>
               </a:rPr>
-              <a:t>폐업 수 줄이기 ②</a:t>
-            </a:r>
-            <a:r>
-              <a:rPr lang="en-US" altLang="ko-KR" sz="2000" dirty="0">
-                <a:latin typeface="나눔스퀘어OTF ExtraBold" panose="020B0600000101010101" pitchFamily="34" charset="-127"/>
-                <a:ea typeface="나눔스퀘어OTF ExtraBold" panose="020B0600000101010101" pitchFamily="34" charset="-127"/>
-              </a:rPr>
-              <a:t>:</a:t>
-            </a:r>
-            <a:r>
-              <a:rPr lang="ko-KR" altLang="en-US" sz="2000" dirty="0">
-                <a:latin typeface="나눔스퀘어OTF ExtraBold" panose="020B0600000101010101" pitchFamily="34" charset="-127"/>
-                <a:ea typeface="나눔스퀘어OTF ExtraBold" panose="020B0600000101010101" pitchFamily="34" charset="-127"/>
-              </a:rPr>
-              <a:t> 체육 분야 관련 국가적 표준 계약서 제안</a:t>
+              <a:t>폐업 수 줄이기</a:t>
             </a:r>
             <a:endParaRPr lang="en-US" altLang="ko-KR" sz="2000" dirty="0">
               <a:latin typeface="나눔스퀘어OTF ExtraBold" panose="020B0600000101010101" pitchFamily="34" charset="-127"/>
@@ -13790,10 +15132,66 @@
           </a:p>
         </p:txBody>
       </p:sp>
+      <p:sp>
+        <p:nvSpPr>
+          <p:cNvPr id="3" name="TextBox 2">
+            <a:extLst>
+              <a:ext uri="{FF2B5EF4-FFF2-40B4-BE49-F238E27FC236}">
+                <a16:creationId xmlns:a16="http://schemas.microsoft.com/office/drawing/2014/main" id="{3B3F0659-9F33-4F45-B753-0D4C16D26225}"/>
+              </a:ext>
+            </a:extLst>
+          </p:cNvPr>
+          <p:cNvSpPr txBox="1"/>
+          <p:nvPr/>
+        </p:nvSpPr>
+        <p:spPr>
+          <a:xfrm>
+            <a:off x="1782147" y="2491273"/>
+            <a:ext cx="4025461" cy="923330"/>
+          </a:xfrm>
+          <a:prstGeom prst="rect">
+            <a:avLst/>
+          </a:prstGeom>
+          <a:noFill/>
+        </p:spPr>
+        <p:txBody>
+          <a:bodyPr wrap="none" rtlCol="0">
+            <a:spAutoFit/>
+          </a:bodyPr>
+          <a:lstStyle/>
+          <a:p>
+            <a:r>
+              <a:rPr lang="ko-KR" altLang="en-US" dirty="0"/>
+              <a:t>스포츠 종목이 다각화됨에 따라</a:t>
+            </a:r>
+            <a:r>
+              <a:rPr lang="en-US" altLang="ko-KR" dirty="0"/>
+              <a:t>,</a:t>
+            </a:r>
+          </a:p>
+          <a:p>
+            <a:endParaRPr lang="en-US" altLang="ko-KR" dirty="0"/>
+          </a:p>
+          <a:p>
+            <a:r>
+              <a:rPr lang="ko-KR" altLang="en-US" dirty="0"/>
+              <a:t>이에 따라</a:t>
+            </a:r>
+            <a:r>
+              <a:rPr lang="en-US" altLang="ko-KR" dirty="0"/>
+              <a:t>, </a:t>
+            </a:r>
+            <a:r>
+              <a:rPr lang="ko-KR" altLang="en-US" dirty="0"/>
+              <a:t>법제화 되지않는 종목들이</a:t>
+            </a:r>
+          </a:p>
+        </p:txBody>
+      </p:sp>
     </p:spTree>
     <p:extLst>
       <p:ext uri="{BB962C8B-B14F-4D97-AF65-F5344CB8AC3E}">
-        <p14:creationId xmlns:p14="http://schemas.microsoft.com/office/powerpoint/2010/main" val="226177996"/>
+        <p14:creationId xmlns:p14="http://schemas.microsoft.com/office/powerpoint/2010/main" val="2205981693"/>
       </p:ext>
     </p:extLst>
   </p:cSld>
@@ -13803,7 +15201,7 @@
 </p:sld>
 </file>
 
-<file path=ppt/slides/slide16.xml><?xml version="1.0" encoding="utf-8"?>
+<file path=ppt/slides/slide17.xml><?xml version="1.0" encoding="utf-8"?>
 <p:sld xmlns:a="http://schemas.openxmlformats.org/drawingml/2006/main" xmlns:r="http://schemas.openxmlformats.org/officeDocument/2006/relationships" xmlns:p="http://schemas.openxmlformats.org/presentationml/2006/main">
   <p:cSld>
     <p:spTree>
@@ -13820,94 +15218,6 @@
           <a:chExt cx="0" cy="0"/>
         </a:xfrm>
       </p:grpSpPr>
-      <p:sp>
-        <p:nvSpPr>
-          <p:cNvPr id="44" name="TextBox 43">
-            <a:extLst>
-              <a:ext uri="{FF2B5EF4-FFF2-40B4-BE49-F238E27FC236}">
-                <a16:creationId xmlns:a16="http://schemas.microsoft.com/office/drawing/2014/main" id="{ED0D1800-22E0-4BCD-8C07-CE52B16A09D4}"/>
-              </a:ext>
-            </a:extLst>
-          </p:cNvPr>
-          <p:cNvSpPr txBox="1"/>
-          <p:nvPr/>
-        </p:nvSpPr>
-        <p:spPr>
-          <a:xfrm>
-            <a:off x="431882" y="1459045"/>
-            <a:ext cx="10177021" cy="400110"/>
-          </a:xfrm>
-          <a:prstGeom prst="rect">
-            <a:avLst/>
-          </a:prstGeom>
-          <a:noFill/>
-        </p:spPr>
-        <p:txBody>
-          <a:bodyPr wrap="square">
-            <a:spAutoFit/>
-          </a:bodyPr>
-          <a:lstStyle/>
-          <a:p>
-            <a:pPr marL="285750" indent="-285750">
-              <a:buFont typeface="Wingdings" panose="05000000000000000000" pitchFamily="2" charset="2"/>
-              <a:buChar char="Ø"/>
-            </a:pPr>
-            <a:r>
-              <a:rPr lang="ko-KR" altLang="en-US" sz="2000" dirty="0">
-                <a:latin typeface="나눔스퀘어OTF ExtraBold" panose="020B0600000101010101" pitchFamily="34" charset="-127"/>
-                <a:ea typeface="나눔스퀘어OTF ExtraBold" panose="020B0600000101010101" pitchFamily="34" charset="-127"/>
-              </a:rPr>
-              <a:t>폐업 수 줄이기 ③</a:t>
-            </a:r>
-            <a:r>
-              <a:rPr lang="en-US" altLang="ko-KR" sz="2000" dirty="0">
-                <a:latin typeface="나눔스퀘어OTF ExtraBold" panose="020B0600000101010101" pitchFamily="34" charset="-127"/>
-                <a:ea typeface="나눔스퀘어OTF ExtraBold" panose="020B0600000101010101" pitchFamily="34" charset="-127"/>
-              </a:rPr>
-              <a:t>: </a:t>
-            </a:r>
-            <a:r>
-              <a:rPr lang="ko-KR" altLang="en-US" sz="2000" dirty="0">
-                <a:latin typeface="나눔스퀘어OTF ExtraBold" panose="020B0600000101010101" pitchFamily="34" charset="-127"/>
-                <a:ea typeface="나눔스퀘어OTF ExtraBold" panose="020B0600000101010101" pitchFamily="34" charset="-127"/>
-              </a:rPr>
-              <a:t>실내 체육 시설 민간 자유업 </a:t>
-            </a:r>
-            <a:r>
-              <a:rPr lang="en-US" altLang="ko-KR" sz="2000" dirty="0">
-                <a:latin typeface="나눔스퀘어OTF ExtraBold" panose="020B0600000101010101" pitchFamily="34" charset="-127"/>
-                <a:ea typeface="나눔스퀘어OTF ExtraBold" panose="020B0600000101010101" pitchFamily="34" charset="-127"/>
-              </a:rPr>
-              <a:t>-&gt; </a:t>
-            </a:r>
-            <a:r>
-              <a:rPr lang="ko-KR" altLang="en-US" sz="2000" dirty="0">
-                <a:latin typeface="나눔스퀘어OTF ExtraBold" panose="020B0600000101010101" pitchFamily="34" charset="-127"/>
-                <a:ea typeface="나눔스퀘어OTF ExtraBold" panose="020B0600000101010101" pitchFamily="34" charset="-127"/>
-              </a:rPr>
-              <a:t>등록</a:t>
-            </a:r>
-            <a:r>
-              <a:rPr lang="en-US" altLang="ko-KR" sz="2000" dirty="0">
-                <a:latin typeface="나눔스퀘어OTF ExtraBold" panose="020B0600000101010101" pitchFamily="34" charset="-127"/>
-                <a:ea typeface="나눔스퀘어OTF ExtraBold" panose="020B0600000101010101" pitchFamily="34" charset="-127"/>
-              </a:rPr>
-              <a:t>/</a:t>
-            </a:r>
-            <a:r>
-              <a:rPr lang="ko-KR" altLang="en-US" sz="2000" dirty="0">
-                <a:latin typeface="나눔스퀘어OTF ExtraBold" panose="020B0600000101010101" pitchFamily="34" charset="-127"/>
-                <a:ea typeface="나눔스퀘어OTF ExtraBold" panose="020B0600000101010101" pitchFamily="34" charset="-127"/>
-              </a:rPr>
-              <a:t>신고 체육 시설 등록 법제화</a:t>
-            </a:r>
-            <a:endParaRPr lang="en-US" altLang="ko-KR" sz="2000" dirty="0">
-              <a:latin typeface="나눔스퀘어OTF ExtraBold" panose="020B0600000101010101" pitchFamily="34" charset="-127"/>
-              <a:ea typeface="나눔스퀘어OTF ExtraBold" panose="020B0600000101010101" pitchFamily="34" charset="-127"/>
-            </a:endParaRPr>
-          </a:p>
-        </p:txBody>
-      </p:sp>
       <p:cxnSp>
         <p:nvCxnSpPr>
           <p:cNvPr id="16" name="직선 연결선 15">
@@ -14382,10 +15692,848 @@
           </a:p>
         </p:txBody>
       </p:sp>
+      <p:sp>
+        <p:nvSpPr>
+          <p:cNvPr id="10" name="TextBox 9">
+            <a:extLst>
+              <a:ext uri="{FF2B5EF4-FFF2-40B4-BE49-F238E27FC236}">
+                <a16:creationId xmlns:a16="http://schemas.microsoft.com/office/drawing/2014/main" id="{AEDC9353-836E-45E1-82EF-AF1B1FC17C2B}"/>
+              </a:ext>
+            </a:extLst>
+          </p:cNvPr>
+          <p:cNvSpPr txBox="1"/>
+          <p:nvPr/>
+        </p:nvSpPr>
+        <p:spPr>
+          <a:xfrm>
+            <a:off x="862476" y="1908592"/>
+            <a:ext cx="3252324" cy="369332"/>
+          </a:xfrm>
+          <a:prstGeom prst="rect">
+            <a:avLst/>
+          </a:prstGeom>
+          <a:noFill/>
+        </p:spPr>
+        <p:txBody>
+          <a:bodyPr wrap="square">
+            <a:spAutoFit/>
+          </a:bodyPr>
+          <a:lstStyle/>
+          <a:p>
+            <a:r>
+              <a:rPr lang="ko-KR" altLang="en-US" sz="1800" dirty="0">
+                <a:latin typeface="나눔스퀘어OTF ExtraBold" panose="020B0600000101010101" pitchFamily="34" charset="-127"/>
+                <a:ea typeface="나눔스퀘어OTF ExtraBold" panose="020B0600000101010101" pitchFamily="34" charset="-127"/>
+              </a:rPr>
+              <a:t>④</a:t>
+            </a:r>
+            <a:r>
+              <a:rPr lang="en-US" altLang="ko-KR" sz="1800" dirty="0">
+                <a:latin typeface="나눔스퀘어OTF ExtraBold" panose="020B0600000101010101" pitchFamily="34" charset="-127"/>
+                <a:ea typeface="나눔스퀘어OTF ExtraBold" panose="020B0600000101010101" pitchFamily="34" charset="-127"/>
+              </a:rPr>
+              <a:t> </a:t>
+            </a:r>
+            <a:r>
+              <a:rPr lang="ko-KR" altLang="en-US" sz="1800" dirty="0">
+                <a:latin typeface="나눔스퀘어OTF ExtraBold" panose="020B0600000101010101" pitchFamily="34" charset="-127"/>
+                <a:ea typeface="나눔스퀘어OTF ExtraBold" panose="020B0600000101010101" pitchFamily="34" charset="-127"/>
+              </a:rPr>
+              <a:t>스포츠 체육 시설 수익 다각화</a:t>
+            </a:r>
+            <a:endParaRPr lang="ko-KR" altLang="en-US" dirty="0"/>
+          </a:p>
+        </p:txBody>
+      </p:sp>
+      <p:sp>
+        <p:nvSpPr>
+          <p:cNvPr id="11" name="TextBox 10">
+            <a:extLst>
+              <a:ext uri="{FF2B5EF4-FFF2-40B4-BE49-F238E27FC236}">
+                <a16:creationId xmlns:a16="http://schemas.microsoft.com/office/drawing/2014/main" id="{CB8B6849-7FAA-4B03-A60C-7324E70193B4}"/>
+              </a:ext>
+            </a:extLst>
+          </p:cNvPr>
+          <p:cNvSpPr txBox="1"/>
+          <p:nvPr/>
+        </p:nvSpPr>
+        <p:spPr>
+          <a:xfrm>
+            <a:off x="431882" y="1458049"/>
+            <a:ext cx="2022069" cy="400110"/>
+          </a:xfrm>
+          <a:prstGeom prst="rect">
+            <a:avLst/>
+          </a:prstGeom>
+          <a:noFill/>
+        </p:spPr>
+        <p:txBody>
+          <a:bodyPr wrap="square">
+            <a:spAutoFit/>
+          </a:bodyPr>
+          <a:lstStyle/>
+          <a:p>
+            <a:pPr marL="285750" indent="-285750">
+              <a:buFont typeface="Wingdings" panose="05000000000000000000" pitchFamily="2" charset="2"/>
+              <a:buChar char="Ø"/>
+            </a:pPr>
+            <a:r>
+              <a:rPr lang="ko-KR" altLang="en-US" sz="2000" dirty="0">
+                <a:latin typeface="나눔스퀘어OTF ExtraBold" panose="020B0600000101010101" pitchFamily="34" charset="-127"/>
+                <a:ea typeface="나눔스퀘어OTF ExtraBold" panose="020B0600000101010101" pitchFamily="34" charset="-127"/>
+              </a:rPr>
+              <a:t>폐업 수 줄이기</a:t>
+            </a:r>
+            <a:endParaRPr lang="en-US" altLang="ko-KR" sz="2000" dirty="0">
+              <a:latin typeface="나눔스퀘어OTF ExtraBold" panose="020B0600000101010101" pitchFamily="34" charset="-127"/>
+              <a:ea typeface="나눔스퀘어OTF ExtraBold" panose="020B0600000101010101" pitchFamily="34" charset="-127"/>
+            </a:endParaRPr>
+          </a:p>
+        </p:txBody>
+      </p:sp>
+      <p:sp>
+        <p:nvSpPr>
+          <p:cNvPr id="7" name="TextBox 6">
+            <a:extLst>
+              <a:ext uri="{FF2B5EF4-FFF2-40B4-BE49-F238E27FC236}">
+                <a16:creationId xmlns:a16="http://schemas.microsoft.com/office/drawing/2014/main" id="{2BFDC258-548E-412E-92D5-2449E67D13DE}"/>
+              </a:ext>
+            </a:extLst>
+          </p:cNvPr>
+          <p:cNvSpPr txBox="1"/>
+          <p:nvPr/>
+        </p:nvSpPr>
+        <p:spPr>
+          <a:xfrm>
+            <a:off x="1461577" y="2439944"/>
+            <a:ext cx="1807805" cy="338554"/>
+          </a:xfrm>
+          <a:prstGeom prst="rect">
+            <a:avLst/>
+          </a:prstGeom>
+          <a:noFill/>
+        </p:spPr>
+        <p:txBody>
+          <a:bodyPr wrap="square">
+            <a:spAutoFit/>
+          </a:bodyPr>
+          <a:lstStyle/>
+          <a:p>
+            <a:r>
+              <a:rPr lang="en-US" altLang="ko-KR" sz="1600" dirty="0">
+                <a:latin typeface="나눔스퀘어OTF ExtraBold" panose="020B0600000101010101" pitchFamily="34" charset="-127"/>
+                <a:ea typeface="나눔스퀘어OTF ExtraBold" panose="020B0600000101010101" pitchFamily="34" charset="-127"/>
+              </a:rPr>
+              <a:t>1) MIX Shop </a:t>
+            </a:r>
+            <a:r>
+              <a:rPr lang="ko-KR" altLang="en-US" sz="1600" dirty="0">
+                <a:latin typeface="나눔스퀘어OTF ExtraBold" panose="020B0600000101010101" pitchFamily="34" charset="-127"/>
+                <a:ea typeface="나눔스퀘어OTF ExtraBold" panose="020B0600000101010101" pitchFamily="34" charset="-127"/>
+              </a:rPr>
+              <a:t>제안</a:t>
+            </a:r>
+            <a:endParaRPr lang="ko-KR" altLang="en-US" sz="1600" dirty="0"/>
+          </a:p>
+        </p:txBody>
+      </p:sp>
+      <p:sp>
+        <p:nvSpPr>
+          <p:cNvPr id="4" name="TextBox 3">
+            <a:extLst>
+              <a:ext uri="{FF2B5EF4-FFF2-40B4-BE49-F238E27FC236}">
+                <a16:creationId xmlns:a16="http://schemas.microsoft.com/office/drawing/2014/main" id="{BDE89917-4B27-4C7F-B0CA-34FC7ABF0E33}"/>
+              </a:ext>
+            </a:extLst>
+          </p:cNvPr>
+          <p:cNvSpPr txBox="1"/>
+          <p:nvPr/>
+        </p:nvSpPr>
+        <p:spPr>
+          <a:xfrm>
+            <a:off x="1875453" y="2877664"/>
+            <a:ext cx="2589170" cy="1477328"/>
+          </a:xfrm>
+          <a:prstGeom prst="rect">
+            <a:avLst/>
+          </a:prstGeom>
+          <a:noFill/>
+        </p:spPr>
+        <p:txBody>
+          <a:bodyPr wrap="none" rtlCol="0">
+            <a:spAutoFit/>
+          </a:bodyPr>
+          <a:lstStyle/>
+          <a:p>
+            <a:pPr marL="342900" indent="-342900">
+              <a:buAutoNum type="alphaLcPeriod"/>
+            </a:pPr>
+            <a:r>
+              <a:rPr lang="ko-KR" altLang="en-US" dirty="0">
+                <a:latin typeface="나눔스퀘어OTF Bold" panose="020B0600000101010101" pitchFamily="34" charset="-127"/>
+                <a:ea typeface="나눔스퀘어OTF Bold" panose="020B0600000101010101" pitchFamily="34" charset="-127"/>
+              </a:rPr>
+              <a:t>헬스장 </a:t>
+            </a:r>
+            <a:r>
+              <a:rPr lang="en-US" altLang="ko-KR" dirty="0">
+                <a:latin typeface="나눔스퀘어OTF Bold" panose="020B0600000101010101" pitchFamily="34" charset="-127"/>
+                <a:ea typeface="나눔스퀘어OTF Bold" panose="020B0600000101010101" pitchFamily="34" charset="-127"/>
+              </a:rPr>
+              <a:t>+ </a:t>
+            </a:r>
+            <a:r>
+              <a:rPr lang="ko-KR" altLang="en-US" dirty="0">
+                <a:latin typeface="나눔스퀘어OTF Bold" panose="020B0600000101010101" pitchFamily="34" charset="-127"/>
+                <a:ea typeface="나눔스퀘어OTF Bold" panose="020B0600000101010101" pitchFamily="34" charset="-127"/>
+              </a:rPr>
+              <a:t>커피</a:t>
+            </a:r>
+            <a:r>
+              <a:rPr lang="en-US" altLang="ko-KR" dirty="0">
+                <a:latin typeface="나눔스퀘어OTF Bold" panose="020B0600000101010101" pitchFamily="34" charset="-127"/>
+                <a:ea typeface="나눔스퀘어OTF Bold" panose="020B0600000101010101" pitchFamily="34" charset="-127"/>
+              </a:rPr>
+              <a:t>, </a:t>
+            </a:r>
+            <a:r>
+              <a:rPr lang="ko-KR" altLang="en-US" dirty="0">
+                <a:latin typeface="나눔스퀘어OTF Bold" panose="020B0600000101010101" pitchFamily="34" charset="-127"/>
+                <a:ea typeface="나눔스퀘어OTF Bold" panose="020B0600000101010101" pitchFamily="34" charset="-127"/>
+              </a:rPr>
+              <a:t>샐러드</a:t>
+            </a:r>
+            <a:endParaRPr lang="en-US" altLang="ko-KR" dirty="0">
+              <a:latin typeface="나눔스퀘어OTF Bold" panose="020B0600000101010101" pitchFamily="34" charset="-127"/>
+              <a:ea typeface="나눔스퀘어OTF Bold" panose="020B0600000101010101" pitchFamily="34" charset="-127"/>
+            </a:endParaRPr>
+          </a:p>
+          <a:p>
+            <a:pPr marL="342900" indent="-342900">
+              <a:buAutoNum type="alphaLcPeriod"/>
+            </a:pPr>
+            <a:endParaRPr lang="en-US" altLang="ko-KR" dirty="0">
+              <a:latin typeface="나눔스퀘어OTF Bold" panose="020B0600000101010101" pitchFamily="34" charset="-127"/>
+              <a:ea typeface="나눔스퀘어OTF Bold" panose="020B0600000101010101" pitchFamily="34" charset="-127"/>
+            </a:endParaRPr>
+          </a:p>
+          <a:p>
+            <a:pPr marL="342900" indent="-342900">
+              <a:buAutoNum type="alphaLcPeriod"/>
+            </a:pPr>
+            <a:r>
+              <a:rPr lang="ko-KR" altLang="en-US" dirty="0">
+                <a:latin typeface="나눔스퀘어OTF Bold" panose="020B0600000101010101" pitchFamily="34" charset="-127"/>
+                <a:ea typeface="나눔스퀘어OTF Bold" panose="020B0600000101010101" pitchFamily="34" charset="-127"/>
+              </a:rPr>
+              <a:t>헬스장 </a:t>
+            </a:r>
+            <a:r>
+              <a:rPr lang="en-US" altLang="ko-KR" dirty="0">
+                <a:latin typeface="나눔스퀘어OTF Bold" panose="020B0600000101010101" pitchFamily="34" charset="-127"/>
+                <a:ea typeface="나눔스퀘어OTF Bold" panose="020B0600000101010101" pitchFamily="34" charset="-127"/>
+              </a:rPr>
+              <a:t>+ VR / AR</a:t>
+            </a:r>
+          </a:p>
+          <a:p>
+            <a:pPr marL="342900" indent="-342900">
+              <a:buAutoNum type="alphaLcPeriod"/>
+            </a:pPr>
+            <a:endParaRPr lang="en-US" altLang="ko-KR" dirty="0">
+              <a:latin typeface="나눔스퀘어OTF Bold" panose="020B0600000101010101" pitchFamily="34" charset="-127"/>
+              <a:ea typeface="나눔스퀘어OTF Bold" panose="020B0600000101010101" pitchFamily="34" charset="-127"/>
+            </a:endParaRPr>
+          </a:p>
+          <a:p>
+            <a:pPr marL="342900" indent="-342900">
+              <a:buAutoNum type="alphaLcPeriod"/>
+            </a:pPr>
+            <a:r>
+              <a:rPr lang="ko-KR" altLang="en-US" dirty="0">
+                <a:latin typeface="나눔스퀘어OTF Bold" panose="020B0600000101010101" pitchFamily="34" charset="-127"/>
+                <a:ea typeface="나눔스퀘어OTF Bold" panose="020B0600000101010101" pitchFamily="34" charset="-127"/>
+              </a:rPr>
+              <a:t>헬스장 </a:t>
+            </a:r>
+            <a:r>
+              <a:rPr lang="en-US" altLang="ko-KR" dirty="0">
+                <a:latin typeface="나눔스퀘어OTF Bold" panose="020B0600000101010101" pitchFamily="34" charset="-127"/>
+                <a:ea typeface="나눔스퀘어OTF Bold" panose="020B0600000101010101" pitchFamily="34" charset="-127"/>
+              </a:rPr>
+              <a:t>+ </a:t>
+            </a:r>
+            <a:r>
+              <a:rPr lang="ko-KR" altLang="en-US" dirty="0">
+                <a:latin typeface="나눔스퀘어OTF Bold" panose="020B0600000101010101" pitchFamily="34" charset="-127"/>
+                <a:ea typeface="나눔스퀘어OTF Bold" panose="020B0600000101010101" pitchFamily="34" charset="-127"/>
+              </a:rPr>
+              <a:t>피부과</a:t>
+            </a:r>
+          </a:p>
+        </p:txBody>
+      </p:sp>
+      <p:sp>
+        <p:nvSpPr>
+          <p:cNvPr id="14" name="TextBox 13">
+            <a:extLst>
+              <a:ext uri="{FF2B5EF4-FFF2-40B4-BE49-F238E27FC236}">
+                <a16:creationId xmlns:a16="http://schemas.microsoft.com/office/drawing/2014/main" id="{BBE07ADC-B770-4EE6-9EB6-609FDACA972B}"/>
+              </a:ext>
+            </a:extLst>
+          </p:cNvPr>
+          <p:cNvSpPr txBox="1"/>
+          <p:nvPr/>
+        </p:nvSpPr>
+        <p:spPr>
+          <a:xfrm>
+            <a:off x="4890224" y="2877664"/>
+            <a:ext cx="4007828" cy="1477328"/>
+          </a:xfrm>
+          <a:prstGeom prst="rect">
+            <a:avLst/>
+          </a:prstGeom>
+          <a:noFill/>
+        </p:spPr>
+        <p:txBody>
+          <a:bodyPr wrap="none" rtlCol="0">
+            <a:spAutoFit/>
+          </a:bodyPr>
+          <a:lstStyle/>
+          <a:p>
+            <a:pPr marL="342900" indent="-342900">
+              <a:buFont typeface="+mj-lt"/>
+              <a:buAutoNum type="alphaLcPeriod" startAt="4"/>
+            </a:pPr>
+            <a:r>
+              <a:rPr lang="ko-KR" altLang="en-US" dirty="0">
+                <a:latin typeface="나눔스퀘어OTF Bold" panose="020B0600000101010101" pitchFamily="34" charset="-127"/>
+                <a:ea typeface="나눔스퀘어OTF Bold" panose="020B0600000101010101" pitchFamily="34" charset="-127"/>
+              </a:rPr>
+              <a:t>요가</a:t>
+            </a:r>
+            <a:r>
+              <a:rPr lang="en-US" altLang="ko-KR" dirty="0">
+                <a:latin typeface="나눔스퀘어OTF Bold" panose="020B0600000101010101" pitchFamily="34" charset="-127"/>
+                <a:ea typeface="나눔스퀘어OTF Bold" panose="020B0600000101010101" pitchFamily="34" charset="-127"/>
+              </a:rPr>
+              <a:t>/</a:t>
+            </a:r>
+            <a:r>
+              <a:rPr lang="ko-KR" altLang="en-US" dirty="0">
+                <a:latin typeface="나눔스퀘어OTF Bold" panose="020B0600000101010101" pitchFamily="34" charset="-127"/>
+                <a:ea typeface="나눔스퀘어OTF Bold" panose="020B0600000101010101" pitchFamily="34" charset="-127"/>
+              </a:rPr>
+              <a:t>필라테스 </a:t>
+            </a:r>
+            <a:r>
+              <a:rPr lang="en-US" altLang="ko-KR" dirty="0">
+                <a:latin typeface="나눔스퀘어OTF Bold" panose="020B0600000101010101" pitchFamily="34" charset="-127"/>
+                <a:ea typeface="나눔스퀘어OTF Bold" panose="020B0600000101010101" pitchFamily="34" charset="-127"/>
+              </a:rPr>
+              <a:t>+ </a:t>
+            </a:r>
+            <a:r>
+              <a:rPr lang="ko-KR" altLang="en-US" dirty="0">
+                <a:latin typeface="나눔스퀘어OTF Bold" panose="020B0600000101010101" pitchFamily="34" charset="-127"/>
+                <a:ea typeface="나눔스퀘어OTF Bold" panose="020B0600000101010101" pitchFamily="34" charset="-127"/>
+              </a:rPr>
+              <a:t>개방형 재활</a:t>
+            </a:r>
+            <a:r>
+              <a:rPr lang="en-US" altLang="ko-KR" dirty="0">
+                <a:latin typeface="나눔스퀘어OTF Bold" panose="020B0600000101010101" pitchFamily="34" charset="-127"/>
+                <a:ea typeface="나눔스퀘어OTF Bold" panose="020B0600000101010101" pitchFamily="34" charset="-127"/>
+              </a:rPr>
+              <a:t>, </a:t>
+            </a:r>
+            <a:r>
+              <a:rPr lang="ko-KR" altLang="en-US" dirty="0">
+                <a:latin typeface="나눔스퀘어OTF Bold" panose="020B0600000101010101" pitchFamily="34" charset="-127"/>
+                <a:ea typeface="나눔스퀘어OTF Bold" panose="020B0600000101010101" pitchFamily="34" charset="-127"/>
+              </a:rPr>
+              <a:t>교정관</a:t>
+            </a:r>
+            <a:endParaRPr lang="en-US" altLang="ko-KR" dirty="0">
+              <a:latin typeface="나눔스퀘어OTF Bold" panose="020B0600000101010101" pitchFamily="34" charset="-127"/>
+              <a:ea typeface="나눔스퀘어OTF Bold" panose="020B0600000101010101" pitchFamily="34" charset="-127"/>
+            </a:endParaRPr>
+          </a:p>
+          <a:p>
+            <a:pPr marL="342900" indent="-342900">
+              <a:buFont typeface="+mj-lt"/>
+              <a:buAutoNum type="alphaLcPeriod" startAt="4"/>
+            </a:pPr>
+            <a:endParaRPr lang="en-US" altLang="ko-KR" dirty="0">
+              <a:latin typeface="나눔스퀘어OTF Bold" panose="020B0600000101010101" pitchFamily="34" charset="-127"/>
+              <a:ea typeface="나눔스퀘어OTF Bold" panose="020B0600000101010101" pitchFamily="34" charset="-127"/>
+            </a:endParaRPr>
+          </a:p>
+          <a:p>
+            <a:pPr marL="342900" indent="-342900">
+              <a:buFont typeface="+mj-lt"/>
+              <a:buAutoNum type="alphaLcPeriod" startAt="4"/>
+            </a:pPr>
+            <a:r>
+              <a:rPr lang="ko-KR" altLang="en-US" dirty="0">
+                <a:latin typeface="나눔스퀘어OTF Bold" panose="020B0600000101010101" pitchFamily="34" charset="-127"/>
+                <a:ea typeface="나눔스퀘어OTF Bold" panose="020B0600000101010101" pitchFamily="34" charset="-127"/>
+              </a:rPr>
+              <a:t>요가</a:t>
+            </a:r>
+            <a:r>
+              <a:rPr lang="en-US" altLang="ko-KR" dirty="0">
+                <a:latin typeface="나눔스퀘어OTF Bold" panose="020B0600000101010101" pitchFamily="34" charset="-127"/>
+                <a:ea typeface="나눔스퀘어OTF Bold" panose="020B0600000101010101" pitchFamily="34" charset="-127"/>
+              </a:rPr>
+              <a:t>/</a:t>
+            </a:r>
+            <a:r>
+              <a:rPr lang="ko-KR" altLang="en-US" dirty="0">
+                <a:latin typeface="나눔스퀘어OTF Bold" panose="020B0600000101010101" pitchFamily="34" charset="-127"/>
+                <a:ea typeface="나눔스퀘어OTF Bold" panose="020B0600000101010101" pitchFamily="34" charset="-127"/>
+              </a:rPr>
+              <a:t>필라테스 </a:t>
+            </a:r>
+            <a:r>
+              <a:rPr lang="en-US" altLang="ko-KR" dirty="0">
+                <a:latin typeface="나눔스퀘어OTF Bold" panose="020B0600000101010101" pitchFamily="34" charset="-127"/>
+                <a:ea typeface="나눔스퀘어OTF Bold" panose="020B0600000101010101" pitchFamily="34" charset="-127"/>
+              </a:rPr>
+              <a:t>+ VR / AR</a:t>
+            </a:r>
+          </a:p>
+          <a:p>
+            <a:pPr marL="342900" indent="-342900">
+              <a:buFont typeface="+mj-lt"/>
+              <a:buAutoNum type="alphaLcPeriod" startAt="4"/>
+            </a:pPr>
+            <a:endParaRPr lang="en-US" altLang="ko-KR" dirty="0">
+              <a:latin typeface="나눔스퀘어OTF Bold" panose="020B0600000101010101" pitchFamily="34" charset="-127"/>
+              <a:ea typeface="나눔스퀘어OTF Bold" panose="020B0600000101010101" pitchFamily="34" charset="-127"/>
+            </a:endParaRPr>
+          </a:p>
+          <a:p>
+            <a:pPr marL="342900" indent="-342900">
+              <a:buFont typeface="+mj-lt"/>
+              <a:buAutoNum type="alphaLcPeriod" startAt="4"/>
+            </a:pPr>
+            <a:r>
+              <a:rPr lang="ko-KR" altLang="en-US" dirty="0">
+                <a:latin typeface="나눔스퀘어OTF Bold" panose="020B0600000101010101" pitchFamily="34" charset="-127"/>
+                <a:ea typeface="나눔스퀘어OTF Bold" panose="020B0600000101010101" pitchFamily="34" charset="-127"/>
+              </a:rPr>
+              <a:t>요가</a:t>
+            </a:r>
+            <a:r>
+              <a:rPr lang="en-US" altLang="ko-KR" dirty="0">
+                <a:latin typeface="나눔스퀘어OTF Bold" panose="020B0600000101010101" pitchFamily="34" charset="-127"/>
+                <a:ea typeface="나눔스퀘어OTF Bold" panose="020B0600000101010101" pitchFamily="34" charset="-127"/>
+              </a:rPr>
+              <a:t>/</a:t>
+            </a:r>
+            <a:r>
+              <a:rPr lang="ko-KR" altLang="en-US" dirty="0">
+                <a:latin typeface="나눔스퀘어OTF Bold" panose="020B0600000101010101" pitchFamily="34" charset="-127"/>
+                <a:ea typeface="나눔스퀘어OTF Bold" panose="020B0600000101010101" pitchFamily="34" charset="-127"/>
+              </a:rPr>
+              <a:t>필라테스 </a:t>
+            </a:r>
+            <a:r>
+              <a:rPr lang="en-US" altLang="ko-KR" dirty="0">
+                <a:latin typeface="나눔스퀘어OTF Bold" panose="020B0600000101010101" pitchFamily="34" charset="-127"/>
+                <a:ea typeface="나눔스퀘어OTF Bold" panose="020B0600000101010101" pitchFamily="34" charset="-127"/>
+              </a:rPr>
+              <a:t>+ </a:t>
+            </a:r>
+            <a:r>
+              <a:rPr lang="ko-KR" altLang="en-US" dirty="0" err="1">
+                <a:latin typeface="나눔스퀘어OTF Bold" panose="020B0600000101010101" pitchFamily="34" charset="-127"/>
+                <a:ea typeface="나눔스퀘어OTF Bold" panose="020B0600000101010101" pitchFamily="34" charset="-127"/>
+              </a:rPr>
+              <a:t>네일샵</a:t>
+            </a:r>
+            <a:endParaRPr lang="ko-KR" altLang="en-US" dirty="0">
+              <a:latin typeface="나눔스퀘어OTF Bold" panose="020B0600000101010101" pitchFamily="34" charset="-127"/>
+              <a:ea typeface="나눔스퀘어OTF Bold" panose="020B0600000101010101" pitchFamily="34" charset="-127"/>
+            </a:endParaRPr>
+          </a:p>
+        </p:txBody>
+      </p:sp>
+      <p:pic>
+        <p:nvPicPr>
+          <p:cNvPr id="6" name="그래픽 5" descr="보디빌더  윤곽선">
+            <a:extLst>
+              <a:ext uri="{FF2B5EF4-FFF2-40B4-BE49-F238E27FC236}">
+                <a16:creationId xmlns:a16="http://schemas.microsoft.com/office/drawing/2014/main" id="{402EC187-8681-4F96-82E9-A37AA5E86C1B}"/>
+              </a:ext>
+            </a:extLst>
+          </p:cNvPr>
+          <p:cNvPicPr>
+            <a:picLocks noChangeAspect="1"/>
+          </p:cNvPicPr>
+          <p:nvPr/>
+        </p:nvPicPr>
+        <p:blipFill>
+          <a:blip r:embed="rId2">
+            <a:extLst>
+              <a:ext uri="{28A0092B-C50C-407E-A947-70E740481C1C}">
+                <a14:useLocalDpi xmlns:a14="http://schemas.microsoft.com/office/drawing/2010/main" val="0"/>
+              </a:ext>
+              <a:ext uri="{96DAC541-7B7A-43D3-8B79-37D633B846F1}">
+                <asvg:svgBlip xmlns:asvg="http://schemas.microsoft.com/office/drawing/2016/SVG/main" r:embed="rId3"/>
+              </a:ext>
+            </a:extLst>
+          </a:blip>
+          <a:stretch>
+            <a:fillRect/>
+          </a:stretch>
+        </p:blipFill>
+        <p:spPr>
+          <a:xfrm>
+            <a:off x="9323653" y="2269551"/>
+            <a:ext cx="2199653" cy="2199653"/>
+          </a:xfrm>
+          <a:prstGeom prst="rect">
+            <a:avLst/>
+          </a:prstGeom>
+        </p:spPr>
+      </p:pic>
+      <p:grpSp>
+        <p:nvGrpSpPr>
+          <p:cNvPr id="19" name="그룹 18">
+            <a:extLst>
+              <a:ext uri="{FF2B5EF4-FFF2-40B4-BE49-F238E27FC236}">
+                <a16:creationId xmlns:a16="http://schemas.microsoft.com/office/drawing/2014/main" id="{1D74C850-9EAE-4B19-95C7-A0AEFBFEF118}"/>
+              </a:ext>
+            </a:extLst>
+          </p:cNvPr>
+          <p:cNvGrpSpPr/>
+          <p:nvPr/>
+        </p:nvGrpSpPr>
+        <p:grpSpPr>
+          <a:xfrm>
+            <a:off x="1461577" y="4450542"/>
+            <a:ext cx="10022591" cy="2140040"/>
+            <a:chOff x="1461577" y="4450542"/>
+            <a:chExt cx="10022591" cy="2140040"/>
+          </a:xfrm>
+        </p:grpSpPr>
+        <p:sp>
+          <p:nvSpPr>
+            <p:cNvPr id="8" name="TextBox 7">
+              <a:extLst>
+                <a:ext uri="{FF2B5EF4-FFF2-40B4-BE49-F238E27FC236}">
+                  <a16:creationId xmlns:a16="http://schemas.microsoft.com/office/drawing/2014/main" id="{6CCB1933-CB18-4CE6-A4BE-1F94EA243CFC}"/>
+                </a:ext>
+              </a:extLst>
+            </p:cNvPr>
+            <p:cNvSpPr txBox="1"/>
+            <p:nvPr/>
+          </p:nvSpPr>
+          <p:spPr>
+            <a:xfrm>
+              <a:off x="1461577" y="4450542"/>
+              <a:ext cx="2463671" cy="338554"/>
+            </a:xfrm>
+            <a:prstGeom prst="rect">
+              <a:avLst/>
+            </a:prstGeom>
+            <a:noFill/>
+          </p:spPr>
+          <p:txBody>
+            <a:bodyPr wrap="square">
+              <a:spAutoFit/>
+            </a:bodyPr>
+            <a:lstStyle/>
+            <a:p>
+              <a:r>
+                <a:rPr lang="en-US" altLang="ko-KR" sz="1600" dirty="0">
+                  <a:latin typeface="나눔스퀘어OTF ExtraBold" panose="020B0600000101010101" pitchFamily="34" charset="-127"/>
+                  <a:ea typeface="나눔스퀘어OTF ExtraBold" panose="020B0600000101010101" pitchFamily="34" charset="-127"/>
+                </a:rPr>
+                <a:t>2) </a:t>
+              </a:r>
+              <a:r>
+                <a:rPr lang="ko-KR" altLang="en-US" sz="1600" dirty="0">
+                  <a:latin typeface="나눔스퀘어OTF ExtraBold" panose="020B0600000101010101" pitchFamily="34" charset="-127"/>
+                  <a:ea typeface="나눔스퀘어OTF ExtraBold" panose="020B0600000101010101" pitchFamily="34" charset="-127"/>
+                </a:rPr>
+                <a:t>온라인 교육 영상 컨텐츠</a:t>
+              </a:r>
+              <a:endParaRPr lang="ko-KR" altLang="en-US" sz="1600" dirty="0"/>
+            </a:p>
+          </p:txBody>
+        </p:sp>
+        <p:sp>
+          <p:nvSpPr>
+            <p:cNvPr id="15" name="TextBox 14">
+              <a:extLst>
+                <a:ext uri="{FF2B5EF4-FFF2-40B4-BE49-F238E27FC236}">
+                  <a16:creationId xmlns:a16="http://schemas.microsoft.com/office/drawing/2014/main" id="{A4C55C45-5524-4D19-93BB-A89A3D5AF29D}"/>
+                </a:ext>
+              </a:extLst>
+            </p:cNvPr>
+            <p:cNvSpPr txBox="1"/>
+            <p:nvPr/>
+          </p:nvSpPr>
+          <p:spPr>
+            <a:xfrm>
+              <a:off x="1875453" y="4918485"/>
+              <a:ext cx="2050561" cy="1477328"/>
+            </a:xfrm>
+            <a:prstGeom prst="rect">
+              <a:avLst/>
+            </a:prstGeom>
+            <a:noFill/>
+          </p:spPr>
+          <p:txBody>
+            <a:bodyPr wrap="none" rtlCol="0">
+              <a:spAutoFit/>
+            </a:bodyPr>
+            <a:lstStyle/>
+            <a:p>
+              <a:pPr marL="342900" indent="-342900">
+                <a:buAutoNum type="alphaLcPeriod"/>
+              </a:pPr>
+              <a:r>
+                <a:rPr lang="ko-KR" altLang="en-US" dirty="0">
+                  <a:latin typeface="나눔스퀘어OTF Bold" panose="020B0600000101010101" pitchFamily="34" charset="-127"/>
+                  <a:ea typeface="나눔스퀘어OTF Bold" panose="020B0600000101010101" pitchFamily="34" charset="-127"/>
+                </a:rPr>
+                <a:t>체육 대학 학생</a:t>
+              </a:r>
+              <a:endParaRPr lang="en-US" altLang="ko-KR" dirty="0">
+                <a:latin typeface="나눔스퀘어OTF Bold" panose="020B0600000101010101" pitchFamily="34" charset="-127"/>
+                <a:ea typeface="나눔스퀘어OTF Bold" panose="020B0600000101010101" pitchFamily="34" charset="-127"/>
+              </a:endParaRPr>
+            </a:p>
+            <a:p>
+              <a:pPr marL="342900" indent="-342900">
+                <a:buAutoNum type="alphaLcPeriod"/>
+              </a:pPr>
+              <a:endParaRPr lang="en-US" altLang="ko-KR" dirty="0">
+                <a:latin typeface="나눔스퀘어OTF Bold" panose="020B0600000101010101" pitchFamily="34" charset="-127"/>
+                <a:ea typeface="나눔스퀘어OTF Bold" panose="020B0600000101010101" pitchFamily="34" charset="-127"/>
+              </a:endParaRPr>
+            </a:p>
+            <a:p>
+              <a:pPr marL="342900" indent="-342900">
+                <a:buAutoNum type="alphaLcPeriod"/>
+              </a:pPr>
+              <a:r>
+                <a:rPr lang="ko-KR" altLang="en-US" dirty="0">
+                  <a:latin typeface="나눔스퀘어OTF Bold" panose="020B0600000101010101" pitchFamily="34" charset="-127"/>
+                  <a:ea typeface="나눔스퀘어OTF Bold" panose="020B0600000101010101" pitchFamily="34" charset="-127"/>
+                </a:rPr>
+                <a:t>초</a:t>
+              </a:r>
+              <a:r>
+                <a:rPr lang="en-US" altLang="ko-KR" dirty="0">
+                  <a:latin typeface="나눔스퀘어OTF Bold" panose="020B0600000101010101" pitchFamily="34" charset="-127"/>
+                  <a:ea typeface="나눔스퀘어OTF Bold" panose="020B0600000101010101" pitchFamily="34" charset="-127"/>
+                </a:rPr>
+                <a:t>/</a:t>
+              </a:r>
+              <a:r>
+                <a:rPr lang="ko-KR" altLang="en-US" dirty="0">
+                  <a:latin typeface="나눔스퀘어OTF Bold" panose="020B0600000101010101" pitchFamily="34" charset="-127"/>
+                  <a:ea typeface="나눔스퀘어OTF Bold" panose="020B0600000101010101" pitchFamily="34" charset="-127"/>
+                </a:rPr>
+                <a:t>중</a:t>
+              </a:r>
+              <a:r>
+                <a:rPr lang="en-US" altLang="ko-KR" dirty="0">
+                  <a:latin typeface="나눔스퀘어OTF Bold" panose="020B0600000101010101" pitchFamily="34" charset="-127"/>
+                  <a:ea typeface="나눔스퀘어OTF Bold" panose="020B0600000101010101" pitchFamily="34" charset="-127"/>
+                </a:rPr>
+                <a:t>/</a:t>
+              </a:r>
+              <a:r>
+                <a:rPr lang="ko-KR" altLang="en-US" dirty="0">
+                  <a:latin typeface="나눔스퀘어OTF Bold" panose="020B0600000101010101" pitchFamily="34" charset="-127"/>
+                  <a:ea typeface="나눔스퀘어OTF Bold" panose="020B0600000101010101" pitchFamily="34" charset="-127"/>
+                </a:rPr>
+                <a:t>고등학생 </a:t>
+              </a:r>
+              <a:endParaRPr lang="en-US" altLang="ko-KR" dirty="0">
+                <a:latin typeface="나눔스퀘어OTF Bold" panose="020B0600000101010101" pitchFamily="34" charset="-127"/>
+                <a:ea typeface="나눔스퀘어OTF Bold" panose="020B0600000101010101" pitchFamily="34" charset="-127"/>
+              </a:endParaRPr>
+            </a:p>
+            <a:p>
+              <a:pPr marL="342900" indent="-342900">
+                <a:buAutoNum type="alphaLcPeriod"/>
+              </a:pPr>
+              <a:endParaRPr lang="en-US" altLang="ko-KR" dirty="0">
+                <a:latin typeface="나눔스퀘어OTF Bold" panose="020B0600000101010101" pitchFamily="34" charset="-127"/>
+                <a:ea typeface="나눔스퀘어OTF Bold" panose="020B0600000101010101" pitchFamily="34" charset="-127"/>
+              </a:endParaRPr>
+            </a:p>
+            <a:p>
+              <a:pPr marL="342900" indent="-342900">
+                <a:buAutoNum type="alphaLcPeriod"/>
+              </a:pPr>
+              <a:r>
+                <a:rPr lang="ko-KR" altLang="en-US" dirty="0">
+                  <a:latin typeface="나눔스퀘어OTF Bold" panose="020B0600000101010101" pitchFamily="34" charset="-127"/>
+                  <a:ea typeface="나눔스퀘어OTF Bold" panose="020B0600000101010101" pitchFamily="34" charset="-127"/>
+                </a:rPr>
+                <a:t>시각 장애인</a:t>
+              </a:r>
+            </a:p>
+          </p:txBody>
+        </p:sp>
+        <p:sp>
+          <p:nvSpPr>
+            <p:cNvPr id="18" name="TextBox 17">
+              <a:extLst>
+                <a:ext uri="{FF2B5EF4-FFF2-40B4-BE49-F238E27FC236}">
+                  <a16:creationId xmlns:a16="http://schemas.microsoft.com/office/drawing/2014/main" id="{9BE37A86-1094-471A-9195-37E8A8E98E56}"/>
+                </a:ext>
+              </a:extLst>
+            </p:cNvPr>
+            <p:cNvSpPr txBox="1"/>
+            <p:nvPr/>
+          </p:nvSpPr>
+          <p:spPr>
+            <a:xfrm>
+              <a:off x="4890224" y="4918485"/>
+              <a:ext cx="2694969" cy="1477328"/>
+            </a:xfrm>
+            <a:prstGeom prst="rect">
+              <a:avLst/>
+            </a:prstGeom>
+            <a:noFill/>
+          </p:spPr>
+          <p:txBody>
+            <a:bodyPr wrap="none" rtlCol="0">
+              <a:spAutoFit/>
+            </a:bodyPr>
+            <a:lstStyle/>
+            <a:p>
+              <a:pPr marL="342900" indent="-342900">
+                <a:buFont typeface="+mj-lt"/>
+                <a:buAutoNum type="alphaLcPeriod" startAt="4"/>
+              </a:pPr>
+              <a:r>
+                <a:rPr lang="ko-KR" altLang="en-US" dirty="0">
+                  <a:latin typeface="나눔스퀘어OTF Bold" panose="020B0600000101010101" pitchFamily="34" charset="-127"/>
+                  <a:ea typeface="나눔스퀘어OTF Bold" panose="020B0600000101010101" pitchFamily="34" charset="-127"/>
+                </a:rPr>
+                <a:t>프로 선수</a:t>
+              </a:r>
+              <a:r>
+                <a:rPr lang="en-US" altLang="ko-KR" dirty="0">
+                  <a:latin typeface="나눔스퀘어OTF Bold" panose="020B0600000101010101" pitchFamily="34" charset="-127"/>
+                  <a:ea typeface="나눔스퀘어OTF Bold" panose="020B0600000101010101" pitchFamily="34" charset="-127"/>
+                </a:rPr>
+                <a:t>/</a:t>
+              </a:r>
+              <a:r>
+                <a:rPr lang="ko-KR" altLang="en-US" dirty="0">
+                  <a:latin typeface="나눔스퀘어OTF Bold" panose="020B0600000101010101" pitchFamily="34" charset="-127"/>
+                  <a:ea typeface="나눔스퀘어OTF Bold" panose="020B0600000101010101" pitchFamily="34" charset="-127"/>
+                </a:rPr>
+                <a:t>직장인 운동 </a:t>
+              </a:r>
+              <a:endParaRPr lang="en-US" altLang="ko-KR" dirty="0">
+                <a:latin typeface="나눔스퀘어OTF Bold" panose="020B0600000101010101" pitchFamily="34" charset="-127"/>
+                <a:ea typeface="나눔스퀘어OTF Bold" panose="020B0600000101010101" pitchFamily="34" charset="-127"/>
+              </a:endParaRPr>
+            </a:p>
+            <a:p>
+              <a:endParaRPr lang="en-US" altLang="ko-KR" dirty="0">
+                <a:latin typeface="나눔스퀘어OTF Bold" panose="020B0600000101010101" pitchFamily="34" charset="-127"/>
+                <a:ea typeface="나눔스퀘어OTF Bold" panose="020B0600000101010101" pitchFamily="34" charset="-127"/>
+              </a:endParaRPr>
+            </a:p>
+            <a:p>
+              <a:pPr marL="342900" indent="-342900">
+                <a:buFont typeface="+mj-lt"/>
+                <a:buAutoNum type="alphaLcPeriod" startAt="5"/>
+              </a:pPr>
+              <a:r>
+                <a:rPr lang="ko-KR" altLang="en-US" dirty="0">
+                  <a:latin typeface="나눔스퀘어OTF Bold" panose="020B0600000101010101" pitchFamily="34" charset="-127"/>
+                  <a:ea typeface="나눔스퀘어OTF Bold" panose="020B0600000101010101" pitchFamily="34" charset="-127"/>
+                </a:rPr>
+                <a:t>노인</a:t>
+              </a:r>
+              <a:endParaRPr lang="en-US" altLang="ko-KR" dirty="0">
+                <a:latin typeface="나눔스퀘어OTF Bold" panose="020B0600000101010101" pitchFamily="34" charset="-127"/>
+                <a:ea typeface="나눔스퀘어OTF Bold" panose="020B0600000101010101" pitchFamily="34" charset="-127"/>
+              </a:endParaRPr>
+            </a:p>
+            <a:p>
+              <a:pPr marL="342900" indent="-342900">
+                <a:buFont typeface="+mj-lt"/>
+                <a:buAutoNum type="alphaLcPeriod" startAt="5"/>
+              </a:pPr>
+              <a:endParaRPr lang="en-US" altLang="ko-KR" dirty="0">
+                <a:latin typeface="나눔스퀘어OTF Bold" panose="020B0600000101010101" pitchFamily="34" charset="-127"/>
+                <a:ea typeface="나눔스퀘어OTF Bold" panose="020B0600000101010101" pitchFamily="34" charset="-127"/>
+              </a:endParaRPr>
+            </a:p>
+            <a:p>
+              <a:pPr marL="342900" indent="-342900">
+                <a:buFont typeface="+mj-lt"/>
+                <a:buAutoNum type="alphaLcPeriod" startAt="5"/>
+              </a:pPr>
+              <a:r>
+                <a:rPr lang="ko-KR" altLang="en-US" dirty="0">
+                  <a:latin typeface="나눔스퀘어OTF Bold" panose="020B0600000101010101" pitchFamily="34" charset="-127"/>
+                  <a:ea typeface="나눔스퀘어OTF Bold" panose="020B0600000101010101" pitchFamily="34" charset="-127"/>
+                </a:rPr>
+                <a:t>여성</a:t>
+              </a:r>
+            </a:p>
+          </p:txBody>
+        </p:sp>
+        <p:pic>
+          <p:nvPicPr>
+            <p:cNvPr id="13" name="그래픽 12" descr="사용자 윤곽선">
+              <a:extLst>
+                <a:ext uri="{FF2B5EF4-FFF2-40B4-BE49-F238E27FC236}">
+                  <a16:creationId xmlns:a16="http://schemas.microsoft.com/office/drawing/2014/main" id="{65E6D805-B71A-466D-B0CE-24334E1B1F30}"/>
+                </a:ext>
+              </a:extLst>
+            </p:cNvPr>
+            <p:cNvPicPr>
+              <a:picLocks noChangeAspect="1"/>
+            </p:cNvPicPr>
+            <p:nvPr/>
+          </p:nvPicPr>
+          <p:blipFill>
+            <a:blip r:embed="rId4">
+              <a:extLst>
+                <a:ext uri="{28A0092B-C50C-407E-A947-70E740481C1C}">
+                  <a14:useLocalDpi xmlns:a14="http://schemas.microsoft.com/office/drawing/2010/main" val="0"/>
+                </a:ext>
+                <a:ext uri="{96DAC541-7B7A-43D3-8B79-37D633B846F1}">
+                  <asvg:svgBlip xmlns:asvg="http://schemas.microsoft.com/office/drawing/2016/SVG/main" r:embed="rId5"/>
+                </a:ext>
+              </a:extLst>
+            </a:blip>
+            <a:stretch>
+              <a:fillRect/>
+            </a:stretch>
+          </p:blipFill>
+          <p:spPr>
+            <a:xfrm>
+              <a:off x="9362790" y="4469204"/>
+              <a:ext cx="2121378" cy="2121378"/>
+            </a:xfrm>
+            <a:prstGeom prst="rect">
+              <a:avLst/>
+            </a:prstGeom>
+          </p:spPr>
+        </p:pic>
+      </p:grpSp>
     </p:spTree>
     <p:extLst>
       <p:ext uri="{BB962C8B-B14F-4D97-AF65-F5344CB8AC3E}">
-        <p14:creationId xmlns:p14="http://schemas.microsoft.com/office/powerpoint/2010/main" val="2205981693"/>
+        <p14:creationId xmlns:p14="http://schemas.microsoft.com/office/powerpoint/2010/main" val="579990419"/>
       </p:ext>
     </p:extLst>
   </p:cSld>
@@ -21504,10 +23652,10 @@
         </p:nvGrpSpPr>
         <p:grpSpPr>
           <a:xfrm>
-            <a:off x="1309575" y="5143721"/>
-            <a:ext cx="9588579" cy="1359716"/>
+            <a:off x="1301710" y="4920662"/>
+            <a:ext cx="9588579" cy="1753134"/>
             <a:chOff x="1309575" y="5143721"/>
-            <a:chExt cx="9588579" cy="1359716"/>
+            <a:chExt cx="9588579" cy="1753134"/>
           </a:xfrm>
         </p:grpSpPr>
         <p:sp>
@@ -21525,7 +23673,7 @@
           <p:spPr>
             <a:xfrm>
               <a:off x="1309575" y="5143721"/>
-              <a:ext cx="9588579" cy="1359716"/>
+              <a:ext cx="9588579" cy="1753134"/>
             </a:xfrm>
             <a:prstGeom prst="rect">
               <a:avLst/>
@@ -21577,7 +23725,7 @@
           <p:spPr>
             <a:xfrm>
               <a:off x="2008757" y="5214158"/>
-              <a:ext cx="8192517" cy="1231106"/>
+              <a:ext cx="8192517" cy="1661993"/>
             </a:xfrm>
             <a:prstGeom prst="rect">
               <a:avLst/>
@@ -21740,6 +23888,61 @@
                 <a:t>신고 체육 시설 등록 법제화</a:t>
               </a:r>
               <a:endParaRPr lang="en-US" altLang="ko-KR" dirty="0">
+                <a:latin typeface="나눔스퀘어OTF ExtraBold" panose="020B0600000101010101" pitchFamily="34" charset="-127"/>
+                <a:ea typeface="나눔스퀘어OTF ExtraBold" panose="020B0600000101010101" pitchFamily="34" charset="-127"/>
+              </a:endParaRPr>
+            </a:p>
+            <a:p>
+              <a:pPr marL="285750" indent="-285750">
+                <a:buFont typeface="Wingdings" panose="05000000000000000000" pitchFamily="2" charset="2"/>
+                <a:buChar char="Ø"/>
+              </a:pPr>
+              <a:endParaRPr lang="en-US" altLang="ko-KR" sz="1000" dirty="0">
+                <a:latin typeface="나눔스퀘어OTF ExtraBold" panose="020B0600000101010101" pitchFamily="34" charset="-127"/>
+                <a:ea typeface="나눔스퀘어OTF ExtraBold" panose="020B0600000101010101" pitchFamily="34" charset="-127"/>
+              </a:endParaRPr>
+            </a:p>
+            <a:p>
+              <a:pPr marL="285750" indent="-285750">
+                <a:buFont typeface="Wingdings" panose="05000000000000000000" pitchFamily="2" charset="2"/>
+                <a:buChar char="Ø"/>
+              </a:pPr>
+              <a:r>
+                <a:rPr lang="ko-KR" altLang="en-US" sz="1800" dirty="0">
+                  <a:latin typeface="나눔스퀘어OTF ExtraBold" panose="020B0600000101010101" pitchFamily="34" charset="-127"/>
+                  <a:ea typeface="나눔스퀘어OTF ExtraBold" panose="020B0600000101010101" pitchFamily="34" charset="-127"/>
+                </a:rPr>
+                <a:t>폐업 수 줄이기 ④</a:t>
+              </a:r>
+              <a:r>
+                <a:rPr lang="en-US" altLang="ko-KR" sz="1800" dirty="0">
+                  <a:latin typeface="나눔스퀘어OTF ExtraBold" panose="020B0600000101010101" pitchFamily="34" charset="-127"/>
+                  <a:ea typeface="나눔스퀘어OTF ExtraBold" panose="020B0600000101010101" pitchFamily="34" charset="-127"/>
+                </a:rPr>
+                <a:t>: </a:t>
+              </a:r>
+              <a:r>
+                <a:rPr lang="ko-KR" altLang="en-US" sz="1800" dirty="0">
+                  <a:latin typeface="나눔스퀘어OTF ExtraBold" panose="020B0600000101010101" pitchFamily="34" charset="-127"/>
+                  <a:ea typeface="나눔스퀘어OTF ExtraBold" panose="020B0600000101010101" pitchFamily="34" charset="-127"/>
+                </a:rPr>
+                <a:t>스포츠 체육 시설 수익 다각화 </a:t>
+              </a:r>
+              <a:r>
+                <a:rPr lang="en-US" altLang="ko-KR" sz="1800" dirty="0">
+                  <a:latin typeface="나눔스퀘어OTF ExtraBold" panose="020B0600000101010101" pitchFamily="34" charset="-127"/>
+                  <a:ea typeface="나눔스퀘어OTF ExtraBold" panose="020B0600000101010101" pitchFamily="34" charset="-127"/>
+                </a:rPr>
+                <a:t>– MIX Shop </a:t>
+              </a:r>
+              <a:r>
+                <a:rPr lang="ko-KR" altLang="en-US" sz="1800" dirty="0">
+                  <a:latin typeface="나눔스퀘어OTF ExtraBold" panose="020B0600000101010101" pitchFamily="34" charset="-127"/>
+                  <a:ea typeface="나눔스퀘어OTF ExtraBold" panose="020B0600000101010101" pitchFamily="34" charset="-127"/>
+                </a:rPr>
+                <a:t>제안</a:t>
+              </a:r>
+              <a:endParaRPr lang="en-US" altLang="ko-KR" sz="1800" dirty="0">
                 <a:latin typeface="나눔스퀘어OTF ExtraBold" panose="020B0600000101010101" pitchFamily="34" charset="-127"/>
                 <a:ea typeface="나눔스퀘어OTF ExtraBold" panose="020B0600000101010101" pitchFamily="34" charset="-127"/>
               </a:endParaRPr>

</xml_diff>